<commit_message>
Updated script powerpoint for hold and wait chain
</commit_message>
<xml_diff>
--- a/Powerpoints/parts.pptx
+++ b/Powerpoints/parts.pptx
@@ -13,6 +13,7 @@
     <p:sldId id="260" r:id="rId7"/>
     <p:sldId id="261" r:id="rId8"/>
     <p:sldId id="262" r:id="rId9"/>
+    <p:sldId id="264" r:id="rId10"/>
   </p:sldIdLst>
   <p:sldSz cx="12192000" cy="6858000"/>
   <p:notesSz cx="6858000" cy="9144000"/>
@@ -280,7 +281,7 @@
           <a:p>
             <a:fld id="{4865D920-62CB-495C-8529-9D6639115F7C}" type="datetimeFigureOut">
               <a:rPr lang="fr-BE" smtClean="0"/>
-              <a:t>21-05-20</a:t>
+              <a:t>09-06-20</a:t>
             </a:fld>
             <a:endParaRPr lang="fr-BE"/>
           </a:p>
@@ -480,7 +481,7 @@
           <a:p>
             <a:fld id="{4865D920-62CB-495C-8529-9D6639115F7C}" type="datetimeFigureOut">
               <a:rPr lang="fr-BE" smtClean="0"/>
-              <a:t>21-05-20</a:t>
+              <a:t>09-06-20</a:t>
             </a:fld>
             <a:endParaRPr lang="fr-BE"/>
           </a:p>
@@ -690,7 +691,7 @@
           <a:p>
             <a:fld id="{4865D920-62CB-495C-8529-9D6639115F7C}" type="datetimeFigureOut">
               <a:rPr lang="fr-BE" smtClean="0"/>
-              <a:t>21-05-20</a:t>
+              <a:t>09-06-20</a:t>
             </a:fld>
             <a:endParaRPr lang="fr-BE"/>
           </a:p>
@@ -890,7 +891,7 @@
           <a:p>
             <a:fld id="{4865D920-62CB-495C-8529-9D6639115F7C}" type="datetimeFigureOut">
               <a:rPr lang="fr-BE" smtClean="0"/>
-              <a:t>21-05-20</a:t>
+              <a:t>09-06-20</a:t>
             </a:fld>
             <a:endParaRPr lang="fr-BE"/>
           </a:p>
@@ -1166,7 +1167,7 @@
           <a:p>
             <a:fld id="{4865D920-62CB-495C-8529-9D6639115F7C}" type="datetimeFigureOut">
               <a:rPr lang="fr-BE" smtClean="0"/>
-              <a:t>21-05-20</a:t>
+              <a:t>09-06-20</a:t>
             </a:fld>
             <a:endParaRPr lang="fr-BE"/>
           </a:p>
@@ -1434,7 +1435,7 @@
           <a:p>
             <a:fld id="{4865D920-62CB-495C-8529-9D6639115F7C}" type="datetimeFigureOut">
               <a:rPr lang="fr-BE" smtClean="0"/>
-              <a:t>21-05-20</a:t>
+              <a:t>09-06-20</a:t>
             </a:fld>
             <a:endParaRPr lang="fr-BE"/>
           </a:p>
@@ -1849,7 +1850,7 @@
           <a:p>
             <a:fld id="{4865D920-62CB-495C-8529-9D6639115F7C}" type="datetimeFigureOut">
               <a:rPr lang="fr-BE" smtClean="0"/>
-              <a:t>21-05-20</a:t>
+              <a:t>09-06-20</a:t>
             </a:fld>
             <a:endParaRPr lang="fr-BE"/>
           </a:p>
@@ -1991,7 +1992,7 @@
           <a:p>
             <a:fld id="{4865D920-62CB-495C-8529-9D6639115F7C}" type="datetimeFigureOut">
               <a:rPr lang="fr-BE" smtClean="0"/>
-              <a:t>21-05-20</a:t>
+              <a:t>09-06-20</a:t>
             </a:fld>
             <a:endParaRPr lang="fr-BE"/>
           </a:p>
@@ -2104,7 +2105,7 @@
           <a:p>
             <a:fld id="{4865D920-62CB-495C-8529-9D6639115F7C}" type="datetimeFigureOut">
               <a:rPr lang="fr-BE" smtClean="0"/>
-              <a:t>21-05-20</a:t>
+              <a:t>09-06-20</a:t>
             </a:fld>
             <a:endParaRPr lang="fr-BE"/>
           </a:p>
@@ -2417,7 +2418,7 @@
           <a:p>
             <a:fld id="{4865D920-62CB-495C-8529-9D6639115F7C}" type="datetimeFigureOut">
               <a:rPr lang="fr-BE" smtClean="0"/>
-              <a:t>21-05-20</a:t>
+              <a:t>09-06-20</a:t>
             </a:fld>
             <a:endParaRPr lang="fr-BE"/>
           </a:p>
@@ -2706,7 +2707,7 @@
           <a:p>
             <a:fld id="{4865D920-62CB-495C-8529-9D6639115F7C}" type="datetimeFigureOut">
               <a:rPr lang="fr-BE" smtClean="0"/>
-              <a:t>21-05-20</a:t>
+              <a:t>09-06-20</a:t>
             </a:fld>
             <a:endParaRPr lang="fr-BE"/>
           </a:p>
@@ -2949,7 +2950,7 @@
           <a:p>
             <a:fld id="{4865D920-62CB-495C-8529-9D6639115F7C}" type="datetimeFigureOut">
               <a:rPr lang="fr-BE" smtClean="0"/>
-              <a:t>21-05-20</a:t>
+              <a:t>09-06-20</a:t>
             </a:fld>
             <a:endParaRPr lang="fr-BE"/>
           </a:p>
@@ -6074,6 +6075,2716 @@
           </p:txBody>
         </p:sp>
       </p:grpSp>
+      <p:sp>
+        <p:nvSpPr>
+          <p:cNvPr id="60" name="Freeform: Shape 59">
+            <a:extLst>
+              <a:ext uri="{FF2B5EF4-FFF2-40B4-BE49-F238E27FC236}">
+                <a16:creationId xmlns:a16="http://schemas.microsoft.com/office/drawing/2014/main" id="{FED28184-210E-4F52-8062-5DD19B950CF1}"/>
+              </a:ext>
+            </a:extLst>
+          </p:cNvPr>
+          <p:cNvSpPr/>
+          <p:nvPr/>
+        </p:nvSpPr>
+        <p:spPr>
+          <a:xfrm>
+            <a:off x="7620408" y="2020987"/>
+            <a:ext cx="1296000" cy="1296000"/>
+          </a:xfrm>
+          <a:custGeom>
+            <a:avLst/>
+            <a:gdLst>
+              <a:gd name="connsiteX0" fmla="*/ 112454 w 1296000"/>
+              <a:gd name="connsiteY0" fmla="*/ 0 h 1296000"/>
+              <a:gd name="connsiteX1" fmla="*/ 1183546 w 1296000"/>
+              <a:gd name="connsiteY1" fmla="*/ 0 h 1296000"/>
+              <a:gd name="connsiteX2" fmla="*/ 1296000 w 1296000"/>
+              <a:gd name="connsiteY2" fmla="*/ 112454 h 1296000"/>
+              <a:gd name="connsiteX3" fmla="*/ 1296000 w 1296000"/>
+              <a:gd name="connsiteY3" fmla="*/ 1183546 h 1296000"/>
+              <a:gd name="connsiteX4" fmla="*/ 1183546 w 1296000"/>
+              <a:gd name="connsiteY4" fmla="*/ 1296000 h 1296000"/>
+              <a:gd name="connsiteX5" fmla="*/ 112454 w 1296000"/>
+              <a:gd name="connsiteY5" fmla="*/ 1296000 h 1296000"/>
+              <a:gd name="connsiteX6" fmla="*/ 0 w 1296000"/>
+              <a:gd name="connsiteY6" fmla="*/ 1183546 h 1296000"/>
+              <a:gd name="connsiteX7" fmla="*/ 0 w 1296000"/>
+              <a:gd name="connsiteY7" fmla="*/ 112454 h 1296000"/>
+              <a:gd name="connsiteX8" fmla="*/ 112454 w 1296000"/>
+              <a:gd name="connsiteY8" fmla="*/ 0 h 1296000"/>
+            </a:gdLst>
+            <a:ahLst/>
+            <a:cxnLst>
+              <a:cxn ang="0">
+                <a:pos x="connsiteX0" y="connsiteY0"/>
+              </a:cxn>
+              <a:cxn ang="0">
+                <a:pos x="connsiteX1" y="connsiteY1"/>
+              </a:cxn>
+              <a:cxn ang="0">
+                <a:pos x="connsiteX2" y="connsiteY2"/>
+              </a:cxn>
+              <a:cxn ang="0">
+                <a:pos x="connsiteX3" y="connsiteY3"/>
+              </a:cxn>
+              <a:cxn ang="0">
+                <a:pos x="connsiteX4" y="connsiteY4"/>
+              </a:cxn>
+              <a:cxn ang="0">
+                <a:pos x="connsiteX5" y="connsiteY5"/>
+              </a:cxn>
+              <a:cxn ang="0">
+                <a:pos x="connsiteX6" y="connsiteY6"/>
+              </a:cxn>
+              <a:cxn ang="0">
+                <a:pos x="connsiteX7" y="connsiteY7"/>
+              </a:cxn>
+              <a:cxn ang="0">
+                <a:pos x="connsiteX8" y="connsiteY8"/>
+              </a:cxn>
+            </a:cxnLst>
+            <a:rect l="l" t="t" r="r" b="b"/>
+            <a:pathLst>
+              <a:path w="1296000" h="1296000">
+                <a:moveTo>
+                  <a:pt x="112454" y="0"/>
+                </a:moveTo>
+                <a:lnTo>
+                  <a:pt x="1183546" y="0"/>
+                </a:lnTo>
+                <a:cubicBezTo>
+                  <a:pt x="1245653" y="0"/>
+                  <a:pt x="1296000" y="50347"/>
+                  <a:pt x="1296000" y="112454"/>
+                </a:cubicBezTo>
+                <a:lnTo>
+                  <a:pt x="1296000" y="1183546"/>
+                </a:lnTo>
+                <a:cubicBezTo>
+                  <a:pt x="1296000" y="1245653"/>
+                  <a:pt x="1245653" y="1296000"/>
+                  <a:pt x="1183546" y="1296000"/>
+                </a:cubicBezTo>
+                <a:lnTo>
+                  <a:pt x="112454" y="1296000"/>
+                </a:lnTo>
+                <a:cubicBezTo>
+                  <a:pt x="50347" y="1296000"/>
+                  <a:pt x="0" y="1245653"/>
+                  <a:pt x="0" y="1183546"/>
+                </a:cubicBezTo>
+                <a:lnTo>
+                  <a:pt x="0" y="112454"/>
+                </a:lnTo>
+                <a:cubicBezTo>
+                  <a:pt x="0" y="50347"/>
+                  <a:pt x="50347" y="0"/>
+                  <a:pt x="112454" y="0"/>
+                </a:cubicBezTo>
+                <a:close/>
+              </a:path>
+            </a:pathLst>
+          </a:custGeom>
+          <a:solidFill>
+            <a:srgbClr val="A347FF"/>
+          </a:solidFill>
+          <a:ln w="76200">
+            <a:solidFill>
+              <a:schemeClr val="tx1">
+                <a:lumMod val="85000"/>
+                <a:lumOff val="15000"/>
+              </a:schemeClr>
+            </a:solidFill>
+          </a:ln>
+          <a:scene3d>
+            <a:camera prst="orthographicFront"/>
+            <a:lightRig rig="threePt" dir="t"/>
+          </a:scene3d>
+          <a:sp3d extrusionH="44450"/>
+        </p:spPr>
+        <p:style>
+          <a:lnRef idx="2">
+            <a:schemeClr val="accent1">
+              <a:shade val="50000"/>
+            </a:schemeClr>
+          </a:lnRef>
+          <a:fillRef idx="1">
+            <a:schemeClr val="accent1"/>
+          </a:fillRef>
+          <a:effectRef idx="0">
+            <a:schemeClr val="accent1"/>
+          </a:effectRef>
+          <a:fontRef idx="minor">
+            <a:schemeClr val="lt1"/>
+          </a:fontRef>
+        </p:style>
+        <p:txBody>
+          <a:bodyPr wrap="square" rtlCol="0" anchor="ctr">
+            <a:noAutofit/>
+          </a:bodyPr>
+          <a:lstStyle/>
+          <a:p>
+            <a:pPr algn="ctr"/>
+            <a:endParaRPr lang="fr-BE"/>
+          </a:p>
+        </p:txBody>
+      </p:sp>
+      <p:grpSp>
+        <p:nvGrpSpPr>
+          <p:cNvPr id="61" name="Group 60">
+            <a:extLst>
+              <a:ext uri="{FF2B5EF4-FFF2-40B4-BE49-F238E27FC236}">
+                <a16:creationId xmlns:a16="http://schemas.microsoft.com/office/drawing/2014/main" id="{3D504286-659C-43FF-84C8-A00E142A2D3D}"/>
+              </a:ext>
+            </a:extLst>
+          </p:cNvPr>
+          <p:cNvGrpSpPr/>
+          <p:nvPr/>
+        </p:nvGrpSpPr>
+        <p:grpSpPr>
+          <a:xfrm>
+            <a:off x="8002147" y="2020987"/>
+            <a:ext cx="266261" cy="249650"/>
+            <a:chOff x="3836108" y="771972"/>
+            <a:chExt cx="266261" cy="249650"/>
+          </a:xfrm>
+        </p:grpSpPr>
+        <p:cxnSp>
+          <p:nvCxnSpPr>
+            <p:cNvPr id="62" name="Straight Connector 61">
+              <a:extLst>
+                <a:ext uri="{FF2B5EF4-FFF2-40B4-BE49-F238E27FC236}">
+                  <a16:creationId xmlns:a16="http://schemas.microsoft.com/office/drawing/2014/main" id="{BE6C6660-4B14-4033-8AB3-8AACF4D67044}"/>
+                </a:ext>
+              </a:extLst>
+            </p:cNvPr>
+            <p:cNvCxnSpPr>
+              <a:cxnSpLocks/>
+            </p:cNvCxnSpPr>
+            <p:nvPr/>
+          </p:nvCxnSpPr>
+          <p:spPr>
+            <a:xfrm flipH="1">
+              <a:off x="3931358" y="771972"/>
+              <a:ext cx="171011" cy="249650"/>
+            </a:xfrm>
+            <a:prstGeom prst="line">
+              <a:avLst/>
+            </a:prstGeom>
+            <a:ln w="76200" cap="rnd">
+              <a:solidFill>
+                <a:schemeClr val="tx1">
+                  <a:lumMod val="85000"/>
+                  <a:lumOff val="15000"/>
+                </a:schemeClr>
+              </a:solidFill>
+            </a:ln>
+          </p:spPr>
+          <p:style>
+            <a:lnRef idx="1">
+              <a:schemeClr val="accent1"/>
+            </a:lnRef>
+            <a:fillRef idx="0">
+              <a:schemeClr val="accent1"/>
+            </a:fillRef>
+            <a:effectRef idx="0">
+              <a:schemeClr val="accent1"/>
+            </a:effectRef>
+            <a:fontRef idx="minor">
+              <a:schemeClr val="tx1"/>
+            </a:fontRef>
+          </p:style>
+        </p:cxnSp>
+        <p:cxnSp>
+          <p:nvCxnSpPr>
+            <p:cNvPr id="63" name="Straight Connector 62">
+              <a:extLst>
+                <a:ext uri="{FF2B5EF4-FFF2-40B4-BE49-F238E27FC236}">
+                  <a16:creationId xmlns:a16="http://schemas.microsoft.com/office/drawing/2014/main" id="{4A15B130-29FA-40F1-AC7B-8EE67402546E}"/>
+                </a:ext>
+              </a:extLst>
+            </p:cNvPr>
+            <p:cNvCxnSpPr>
+              <a:cxnSpLocks/>
+            </p:cNvCxnSpPr>
+            <p:nvPr/>
+          </p:nvCxnSpPr>
+          <p:spPr>
+            <a:xfrm flipH="1">
+              <a:off x="3836108" y="1021622"/>
+              <a:ext cx="95250" cy="0"/>
+            </a:xfrm>
+            <a:prstGeom prst="line">
+              <a:avLst/>
+            </a:prstGeom>
+            <a:ln w="76200" cap="rnd">
+              <a:solidFill>
+                <a:schemeClr val="tx1">
+                  <a:lumMod val="85000"/>
+                  <a:lumOff val="15000"/>
+                </a:schemeClr>
+              </a:solidFill>
+            </a:ln>
+          </p:spPr>
+          <p:style>
+            <a:lnRef idx="1">
+              <a:schemeClr val="accent1"/>
+            </a:lnRef>
+            <a:fillRef idx="0">
+              <a:schemeClr val="accent1"/>
+            </a:fillRef>
+            <a:effectRef idx="0">
+              <a:schemeClr val="accent1"/>
+            </a:effectRef>
+            <a:fontRef idx="minor">
+              <a:schemeClr val="tx1"/>
+            </a:fontRef>
+          </p:style>
+        </p:cxnSp>
+      </p:grpSp>
+      <p:sp>
+        <p:nvSpPr>
+          <p:cNvPr id="64" name="Oval 63">
+            <a:extLst>
+              <a:ext uri="{FF2B5EF4-FFF2-40B4-BE49-F238E27FC236}">
+                <a16:creationId xmlns:a16="http://schemas.microsoft.com/office/drawing/2014/main" id="{A8D74B4C-E59F-44FD-804D-88A0AB610ED6}"/>
+              </a:ext>
+            </a:extLst>
+          </p:cNvPr>
+          <p:cNvSpPr/>
+          <p:nvPr/>
+        </p:nvSpPr>
+        <p:spPr>
+          <a:xfrm>
+            <a:off x="7845397" y="2197113"/>
+            <a:ext cx="147600" cy="147048"/>
+          </a:xfrm>
+          <a:prstGeom prst="ellipse">
+            <a:avLst/>
+          </a:prstGeom>
+          <a:solidFill>
+            <a:srgbClr val="FFC000"/>
+          </a:solidFill>
+          <a:ln w="76200">
+            <a:solidFill>
+              <a:schemeClr val="tx1">
+                <a:lumMod val="85000"/>
+                <a:lumOff val="15000"/>
+              </a:schemeClr>
+            </a:solidFill>
+          </a:ln>
+        </p:spPr>
+        <p:style>
+          <a:lnRef idx="2">
+            <a:schemeClr val="accent1">
+              <a:shade val="50000"/>
+            </a:schemeClr>
+          </a:lnRef>
+          <a:fillRef idx="1">
+            <a:schemeClr val="accent1"/>
+          </a:fillRef>
+          <a:effectRef idx="0">
+            <a:schemeClr val="accent1"/>
+          </a:effectRef>
+          <a:fontRef idx="minor">
+            <a:schemeClr val="lt1"/>
+          </a:fontRef>
+        </p:style>
+        <p:txBody>
+          <a:bodyPr rtlCol="0" anchor="ctr"/>
+          <a:lstStyle/>
+          <a:p>
+            <a:pPr algn="ctr"/>
+            <a:endParaRPr lang="fr-BE"/>
+          </a:p>
+        </p:txBody>
+      </p:sp>
+      <p:grpSp>
+        <p:nvGrpSpPr>
+          <p:cNvPr id="65" name="Group 64">
+            <a:extLst>
+              <a:ext uri="{FF2B5EF4-FFF2-40B4-BE49-F238E27FC236}">
+                <a16:creationId xmlns:a16="http://schemas.microsoft.com/office/drawing/2014/main" id="{60B488A5-6391-4C2E-92FF-5AFB662222D7}"/>
+              </a:ext>
+            </a:extLst>
+          </p:cNvPr>
+          <p:cNvGrpSpPr/>
+          <p:nvPr/>
+        </p:nvGrpSpPr>
+        <p:grpSpPr>
+          <a:xfrm>
+            <a:off x="8605771" y="2984272"/>
+            <a:ext cx="249650" cy="266260"/>
+            <a:chOff x="4439732" y="1735257"/>
+            <a:chExt cx="249650" cy="266260"/>
+          </a:xfrm>
+        </p:grpSpPr>
+        <p:cxnSp>
+          <p:nvCxnSpPr>
+            <p:cNvPr id="66" name="Straight Connector 65">
+              <a:extLst>
+                <a:ext uri="{FF2B5EF4-FFF2-40B4-BE49-F238E27FC236}">
+                  <a16:creationId xmlns:a16="http://schemas.microsoft.com/office/drawing/2014/main" id="{E1637452-8081-4304-8C99-21A8624CA369}"/>
+                </a:ext>
+              </a:extLst>
+            </p:cNvPr>
+            <p:cNvCxnSpPr>
+              <a:cxnSpLocks/>
+            </p:cNvCxnSpPr>
+            <p:nvPr/>
+          </p:nvCxnSpPr>
+          <p:spPr>
+            <a:xfrm rot="5400000" flipH="1">
+              <a:off x="4479051" y="1791187"/>
+              <a:ext cx="171011" cy="249650"/>
+            </a:xfrm>
+            <a:prstGeom prst="line">
+              <a:avLst/>
+            </a:prstGeom>
+            <a:ln w="76200" cap="rnd">
+              <a:solidFill>
+                <a:schemeClr val="tx1">
+                  <a:lumMod val="85000"/>
+                  <a:lumOff val="15000"/>
+                </a:schemeClr>
+              </a:solidFill>
+            </a:ln>
+          </p:spPr>
+          <p:style>
+            <a:lnRef idx="1">
+              <a:schemeClr val="accent1"/>
+            </a:lnRef>
+            <a:fillRef idx="0">
+              <a:schemeClr val="accent1"/>
+            </a:fillRef>
+            <a:effectRef idx="0">
+              <a:schemeClr val="accent1"/>
+            </a:effectRef>
+            <a:fontRef idx="minor">
+              <a:schemeClr val="tx1"/>
+            </a:fontRef>
+          </p:style>
+        </p:cxnSp>
+        <p:cxnSp>
+          <p:nvCxnSpPr>
+            <p:cNvPr id="67" name="Straight Connector 66">
+              <a:extLst>
+                <a:ext uri="{FF2B5EF4-FFF2-40B4-BE49-F238E27FC236}">
+                  <a16:creationId xmlns:a16="http://schemas.microsoft.com/office/drawing/2014/main" id="{D1ABE8A1-D5F5-4049-948A-A93181F0D817}"/>
+                </a:ext>
+              </a:extLst>
+            </p:cNvPr>
+            <p:cNvCxnSpPr>
+              <a:cxnSpLocks/>
+            </p:cNvCxnSpPr>
+            <p:nvPr/>
+          </p:nvCxnSpPr>
+          <p:spPr>
+            <a:xfrm rot="5400000" flipH="1">
+              <a:off x="4392107" y="1782882"/>
+              <a:ext cx="95250" cy="0"/>
+            </a:xfrm>
+            <a:prstGeom prst="line">
+              <a:avLst/>
+            </a:prstGeom>
+            <a:ln w="76200" cap="rnd">
+              <a:solidFill>
+                <a:schemeClr val="tx1">
+                  <a:lumMod val="85000"/>
+                  <a:lumOff val="15000"/>
+                </a:schemeClr>
+              </a:solidFill>
+            </a:ln>
+          </p:spPr>
+          <p:style>
+            <a:lnRef idx="1">
+              <a:schemeClr val="accent1"/>
+            </a:lnRef>
+            <a:fillRef idx="0">
+              <a:schemeClr val="accent1"/>
+            </a:fillRef>
+            <a:effectRef idx="0">
+              <a:schemeClr val="accent1"/>
+            </a:effectRef>
+            <a:fontRef idx="minor">
+              <a:schemeClr val="tx1"/>
+            </a:fontRef>
+          </p:style>
+        </p:cxnSp>
+      </p:grpSp>
+      <p:sp>
+        <p:nvSpPr>
+          <p:cNvPr id="68" name="Oval 67">
+            <a:extLst>
+              <a:ext uri="{FF2B5EF4-FFF2-40B4-BE49-F238E27FC236}">
+                <a16:creationId xmlns:a16="http://schemas.microsoft.com/office/drawing/2014/main" id="{764232EC-6D5A-435A-ADF1-C1A993EDF384}"/>
+              </a:ext>
+            </a:extLst>
+          </p:cNvPr>
+          <p:cNvSpPr/>
+          <p:nvPr/>
+        </p:nvSpPr>
+        <p:spPr>
+          <a:xfrm rot="5400000">
+            <a:off x="8531971" y="2827798"/>
+            <a:ext cx="147600" cy="147048"/>
+          </a:xfrm>
+          <a:prstGeom prst="ellipse">
+            <a:avLst/>
+          </a:prstGeom>
+          <a:solidFill>
+            <a:srgbClr val="FFC000"/>
+          </a:solidFill>
+          <a:ln w="76200">
+            <a:solidFill>
+              <a:schemeClr val="tx1">
+                <a:lumMod val="85000"/>
+                <a:lumOff val="15000"/>
+              </a:schemeClr>
+            </a:solidFill>
+          </a:ln>
+        </p:spPr>
+        <p:style>
+          <a:lnRef idx="2">
+            <a:schemeClr val="accent1">
+              <a:shade val="50000"/>
+            </a:schemeClr>
+          </a:lnRef>
+          <a:fillRef idx="1">
+            <a:schemeClr val="accent1"/>
+          </a:fillRef>
+          <a:effectRef idx="0">
+            <a:schemeClr val="accent1"/>
+          </a:effectRef>
+          <a:fontRef idx="minor">
+            <a:schemeClr val="lt1"/>
+          </a:fontRef>
+        </p:style>
+        <p:txBody>
+          <a:bodyPr rtlCol="0" anchor="ctr"/>
+          <a:lstStyle/>
+          <a:p>
+            <a:pPr algn="ctr"/>
+            <a:endParaRPr lang="fr-BE" dirty="0"/>
+          </a:p>
+        </p:txBody>
+      </p:sp>
+      <p:grpSp>
+        <p:nvGrpSpPr>
+          <p:cNvPr id="69" name="Group 68">
+            <a:extLst>
+              <a:ext uri="{FF2B5EF4-FFF2-40B4-BE49-F238E27FC236}">
+                <a16:creationId xmlns:a16="http://schemas.microsoft.com/office/drawing/2014/main" id="{1A55E8FC-57FF-4A3B-8C8E-156848ED6AFE}"/>
+              </a:ext>
+            </a:extLst>
+          </p:cNvPr>
+          <p:cNvGrpSpPr/>
+          <p:nvPr/>
+        </p:nvGrpSpPr>
+        <p:grpSpPr>
+          <a:xfrm>
+            <a:off x="8595986" y="2324070"/>
+            <a:ext cx="4013639" cy="1294276"/>
+            <a:chOff x="4429947" y="1075055"/>
+            <a:chExt cx="4013639" cy="1294276"/>
+          </a:xfrm>
+        </p:grpSpPr>
+        <p:cxnSp>
+          <p:nvCxnSpPr>
+            <p:cNvPr id="70" name="Straight Connector 69">
+              <a:extLst>
+                <a:ext uri="{FF2B5EF4-FFF2-40B4-BE49-F238E27FC236}">
+                  <a16:creationId xmlns:a16="http://schemas.microsoft.com/office/drawing/2014/main" id="{5136605D-4552-48EB-8B86-7ED8AB1811F9}"/>
+                </a:ext>
+              </a:extLst>
+            </p:cNvPr>
+            <p:cNvCxnSpPr>
+              <a:cxnSpLocks/>
+            </p:cNvCxnSpPr>
+            <p:nvPr/>
+          </p:nvCxnSpPr>
+          <p:spPr>
+            <a:xfrm flipH="1">
+              <a:off x="4429947" y="1075055"/>
+              <a:ext cx="320422" cy="0"/>
+            </a:xfrm>
+            <a:prstGeom prst="line">
+              <a:avLst/>
+            </a:prstGeom>
+            <a:ln w="76200" cap="rnd">
+              <a:solidFill>
+                <a:schemeClr val="tx1">
+                  <a:lumMod val="85000"/>
+                  <a:lumOff val="15000"/>
+                </a:schemeClr>
+              </a:solidFill>
+            </a:ln>
+          </p:spPr>
+          <p:style>
+            <a:lnRef idx="1">
+              <a:schemeClr val="accent1"/>
+            </a:lnRef>
+            <a:fillRef idx="0">
+              <a:schemeClr val="accent1"/>
+            </a:fillRef>
+            <a:effectRef idx="0">
+              <a:schemeClr val="accent1"/>
+            </a:effectRef>
+            <a:fontRef idx="minor">
+              <a:schemeClr val="tx1"/>
+            </a:fontRef>
+          </p:style>
+        </p:cxnSp>
+        <p:cxnSp>
+          <p:nvCxnSpPr>
+            <p:cNvPr id="71" name="Straight Connector 70">
+              <a:extLst>
+                <a:ext uri="{FF2B5EF4-FFF2-40B4-BE49-F238E27FC236}">
+                  <a16:creationId xmlns:a16="http://schemas.microsoft.com/office/drawing/2014/main" id="{1233B92C-89F1-452F-B0F8-1BCBF9E6A634}"/>
+                </a:ext>
+              </a:extLst>
+            </p:cNvPr>
+            <p:cNvCxnSpPr>
+              <a:cxnSpLocks/>
+              <a:endCxn id="72" idx="7"/>
+            </p:cNvCxnSpPr>
+            <p:nvPr/>
+          </p:nvCxnSpPr>
+          <p:spPr>
+            <a:xfrm flipH="1">
+              <a:off x="8281710" y="2171670"/>
+              <a:ext cx="161876" cy="197661"/>
+            </a:xfrm>
+            <a:prstGeom prst="line">
+              <a:avLst/>
+            </a:prstGeom>
+            <a:ln w="76200" cap="rnd">
+              <a:solidFill>
+                <a:schemeClr val="tx1">
+                  <a:lumMod val="85000"/>
+                  <a:lumOff val="15000"/>
+                </a:schemeClr>
+              </a:solidFill>
+            </a:ln>
+          </p:spPr>
+          <p:style>
+            <a:lnRef idx="1">
+              <a:schemeClr val="accent1"/>
+            </a:lnRef>
+            <a:fillRef idx="0">
+              <a:schemeClr val="accent1"/>
+            </a:fillRef>
+            <a:effectRef idx="0">
+              <a:schemeClr val="accent1"/>
+            </a:effectRef>
+            <a:fontRef idx="minor">
+              <a:schemeClr val="tx1"/>
+            </a:fontRef>
+          </p:style>
+        </p:cxnSp>
+      </p:grpSp>
+      <p:sp>
+        <p:nvSpPr>
+          <p:cNvPr id="72" name="Oval 71">
+            <a:extLst>
+              <a:ext uri="{FF2B5EF4-FFF2-40B4-BE49-F238E27FC236}">
+                <a16:creationId xmlns:a16="http://schemas.microsoft.com/office/drawing/2014/main" id="{3C25DDB6-9BEA-494B-A3A7-1D8181B62756}"/>
+              </a:ext>
+            </a:extLst>
+          </p:cNvPr>
+          <p:cNvSpPr/>
+          <p:nvPr/>
+        </p:nvSpPr>
+        <p:spPr>
+          <a:xfrm>
+            <a:off x="8308126" y="2500196"/>
+            <a:ext cx="147600" cy="147048"/>
+          </a:xfrm>
+          <a:prstGeom prst="ellipse">
+            <a:avLst/>
+          </a:prstGeom>
+          <a:solidFill>
+            <a:srgbClr val="FFC000"/>
+          </a:solidFill>
+          <a:ln w="76200">
+            <a:solidFill>
+              <a:schemeClr val="tx1">
+                <a:lumMod val="85000"/>
+                <a:lumOff val="15000"/>
+              </a:schemeClr>
+            </a:solidFill>
+          </a:ln>
+        </p:spPr>
+        <p:style>
+          <a:lnRef idx="2">
+            <a:schemeClr val="accent1">
+              <a:shade val="50000"/>
+            </a:schemeClr>
+          </a:lnRef>
+          <a:fillRef idx="1">
+            <a:schemeClr val="accent1"/>
+          </a:fillRef>
+          <a:effectRef idx="0">
+            <a:schemeClr val="accent1"/>
+          </a:effectRef>
+          <a:fontRef idx="minor">
+            <a:schemeClr val="lt1"/>
+          </a:fontRef>
+        </p:style>
+        <p:txBody>
+          <a:bodyPr rtlCol="0" anchor="ctr"/>
+          <a:lstStyle/>
+          <a:p>
+            <a:pPr algn="ctr"/>
+            <a:endParaRPr lang="fr-BE" dirty="0"/>
+          </a:p>
+        </p:txBody>
+      </p:sp>
+      <p:sp>
+        <p:nvSpPr>
+          <p:cNvPr id="73" name="Oval 72">
+            <a:extLst>
+              <a:ext uri="{FF2B5EF4-FFF2-40B4-BE49-F238E27FC236}">
+                <a16:creationId xmlns:a16="http://schemas.microsoft.com/office/drawing/2014/main" id="{F590600C-524D-4BF1-8B17-575B225282F0}"/>
+              </a:ext>
+            </a:extLst>
+          </p:cNvPr>
+          <p:cNvSpPr/>
+          <p:nvPr/>
+        </p:nvSpPr>
+        <p:spPr>
+          <a:xfrm rot="10800000">
+            <a:off x="8147534" y="2825901"/>
+            <a:ext cx="147600" cy="147048"/>
+          </a:xfrm>
+          <a:prstGeom prst="ellipse">
+            <a:avLst/>
+          </a:prstGeom>
+          <a:solidFill>
+            <a:srgbClr val="FFC000"/>
+          </a:solidFill>
+          <a:ln w="76200">
+            <a:solidFill>
+              <a:schemeClr val="tx1">
+                <a:lumMod val="85000"/>
+                <a:lumOff val="15000"/>
+              </a:schemeClr>
+            </a:solidFill>
+          </a:ln>
+        </p:spPr>
+        <p:style>
+          <a:lnRef idx="2">
+            <a:schemeClr val="accent1">
+              <a:shade val="50000"/>
+            </a:schemeClr>
+          </a:lnRef>
+          <a:fillRef idx="1">
+            <a:schemeClr val="accent1"/>
+          </a:fillRef>
+          <a:effectRef idx="0">
+            <a:schemeClr val="accent1"/>
+          </a:effectRef>
+          <a:fontRef idx="minor">
+            <a:schemeClr val="lt1"/>
+          </a:fontRef>
+        </p:style>
+        <p:txBody>
+          <a:bodyPr rtlCol="0" anchor="ctr"/>
+          <a:lstStyle/>
+          <a:p>
+            <a:pPr algn="ctr"/>
+            <a:endParaRPr lang="fr-BE"/>
+          </a:p>
+        </p:txBody>
+      </p:sp>
+      <p:grpSp>
+        <p:nvGrpSpPr>
+          <p:cNvPr id="74" name="Group 73">
+            <a:extLst>
+              <a:ext uri="{FF2B5EF4-FFF2-40B4-BE49-F238E27FC236}">
+                <a16:creationId xmlns:a16="http://schemas.microsoft.com/office/drawing/2014/main" id="{29E1F58F-D792-460E-BAD5-9B82AEFD4B97}"/>
+              </a:ext>
+            </a:extLst>
+          </p:cNvPr>
+          <p:cNvGrpSpPr/>
+          <p:nvPr/>
+        </p:nvGrpSpPr>
+        <p:grpSpPr>
+          <a:xfrm>
+            <a:off x="7660126" y="2761722"/>
+            <a:ext cx="460682" cy="143545"/>
+            <a:chOff x="3494087" y="1512707"/>
+            <a:chExt cx="460682" cy="143545"/>
+          </a:xfrm>
+        </p:grpSpPr>
+        <p:cxnSp>
+          <p:nvCxnSpPr>
+            <p:cNvPr id="75" name="Straight Connector 74">
+              <a:extLst>
+                <a:ext uri="{FF2B5EF4-FFF2-40B4-BE49-F238E27FC236}">
+                  <a16:creationId xmlns:a16="http://schemas.microsoft.com/office/drawing/2014/main" id="{69C6E4C6-79D6-4DAF-B9E4-76270C1291CD}"/>
+                </a:ext>
+              </a:extLst>
+            </p:cNvPr>
+            <p:cNvCxnSpPr>
+              <a:cxnSpLocks/>
+            </p:cNvCxnSpPr>
+            <p:nvPr/>
+          </p:nvCxnSpPr>
+          <p:spPr>
+            <a:xfrm rot="10800000" flipH="1">
+              <a:off x="3494087" y="1512707"/>
+              <a:ext cx="320422" cy="0"/>
+            </a:xfrm>
+            <a:prstGeom prst="line">
+              <a:avLst/>
+            </a:prstGeom>
+            <a:ln w="76200" cap="rnd">
+              <a:solidFill>
+                <a:schemeClr val="tx1">
+                  <a:lumMod val="85000"/>
+                  <a:lumOff val="15000"/>
+                </a:schemeClr>
+              </a:solidFill>
+            </a:ln>
+          </p:spPr>
+          <p:style>
+            <a:lnRef idx="1">
+              <a:schemeClr val="accent1"/>
+            </a:lnRef>
+            <a:fillRef idx="0">
+              <a:schemeClr val="accent1"/>
+            </a:fillRef>
+            <a:effectRef idx="0">
+              <a:schemeClr val="accent1"/>
+            </a:effectRef>
+            <a:fontRef idx="minor">
+              <a:schemeClr val="tx1"/>
+            </a:fontRef>
+          </p:style>
+        </p:cxnSp>
+        <p:cxnSp>
+          <p:nvCxnSpPr>
+            <p:cNvPr id="76" name="Straight Connector 75">
+              <a:extLst>
+                <a:ext uri="{FF2B5EF4-FFF2-40B4-BE49-F238E27FC236}">
+                  <a16:creationId xmlns:a16="http://schemas.microsoft.com/office/drawing/2014/main" id="{CB8C182C-CA2E-42B0-898D-516FD2A1F471}"/>
+                </a:ext>
+              </a:extLst>
+            </p:cNvPr>
+            <p:cNvCxnSpPr>
+              <a:cxnSpLocks/>
+            </p:cNvCxnSpPr>
+            <p:nvPr/>
+          </p:nvCxnSpPr>
+          <p:spPr>
+            <a:xfrm>
+              <a:off x="3814509" y="1512708"/>
+              <a:ext cx="0" cy="143544"/>
+            </a:xfrm>
+            <a:prstGeom prst="line">
+              <a:avLst/>
+            </a:prstGeom>
+            <a:ln w="76200" cap="rnd">
+              <a:solidFill>
+                <a:schemeClr val="tx1">
+                  <a:lumMod val="85000"/>
+                  <a:lumOff val="15000"/>
+                </a:schemeClr>
+              </a:solidFill>
+            </a:ln>
+          </p:spPr>
+          <p:style>
+            <a:lnRef idx="1">
+              <a:schemeClr val="accent1"/>
+            </a:lnRef>
+            <a:fillRef idx="0">
+              <a:schemeClr val="accent1"/>
+            </a:fillRef>
+            <a:effectRef idx="0">
+              <a:schemeClr val="accent1"/>
+            </a:effectRef>
+            <a:fontRef idx="minor">
+              <a:schemeClr val="tx1"/>
+            </a:fontRef>
+          </p:style>
+        </p:cxnSp>
+        <p:cxnSp>
+          <p:nvCxnSpPr>
+            <p:cNvPr id="77" name="Straight Connector 76">
+              <a:extLst>
+                <a:ext uri="{FF2B5EF4-FFF2-40B4-BE49-F238E27FC236}">
+                  <a16:creationId xmlns:a16="http://schemas.microsoft.com/office/drawing/2014/main" id="{35EE60FA-88C1-436C-963B-86C86F056B61}"/>
+                </a:ext>
+              </a:extLst>
+            </p:cNvPr>
+            <p:cNvCxnSpPr>
+              <a:cxnSpLocks/>
+            </p:cNvCxnSpPr>
+            <p:nvPr/>
+          </p:nvCxnSpPr>
+          <p:spPr>
+            <a:xfrm>
+              <a:off x="3814509" y="1656252"/>
+              <a:ext cx="140260" cy="0"/>
+            </a:xfrm>
+            <a:prstGeom prst="line">
+              <a:avLst/>
+            </a:prstGeom>
+            <a:ln w="76200" cap="rnd">
+              <a:solidFill>
+                <a:schemeClr val="tx1">
+                  <a:lumMod val="85000"/>
+                  <a:lumOff val="15000"/>
+                </a:schemeClr>
+              </a:solidFill>
+            </a:ln>
+          </p:spPr>
+          <p:style>
+            <a:lnRef idx="1">
+              <a:schemeClr val="accent1"/>
+            </a:lnRef>
+            <a:fillRef idx="0">
+              <a:schemeClr val="accent1"/>
+            </a:fillRef>
+            <a:effectRef idx="0">
+              <a:schemeClr val="accent1"/>
+            </a:effectRef>
+            <a:fontRef idx="minor">
+              <a:schemeClr val="tx1"/>
+            </a:fontRef>
+          </p:style>
+        </p:cxnSp>
+      </p:grpSp>
+      <p:sp>
+        <p:nvSpPr>
+          <p:cNvPr id="78" name="Oval 77">
+            <a:extLst>
+              <a:ext uri="{FF2B5EF4-FFF2-40B4-BE49-F238E27FC236}">
+                <a16:creationId xmlns:a16="http://schemas.microsoft.com/office/drawing/2014/main" id="{8C141836-B0D3-4D0F-BF13-133CB5371DBC}"/>
+              </a:ext>
+            </a:extLst>
+          </p:cNvPr>
+          <p:cNvSpPr/>
+          <p:nvPr/>
+        </p:nvSpPr>
+        <p:spPr>
+          <a:xfrm>
+            <a:off x="7844133" y="2513389"/>
+            <a:ext cx="83376" cy="86450"/>
+          </a:xfrm>
+          <a:prstGeom prst="ellipse">
+            <a:avLst/>
+          </a:prstGeom>
+          <a:solidFill>
+            <a:schemeClr val="tx1">
+              <a:lumMod val="85000"/>
+              <a:lumOff val="15000"/>
+            </a:schemeClr>
+          </a:solidFill>
+          <a:ln>
+            <a:noFill/>
+          </a:ln>
+        </p:spPr>
+        <p:style>
+          <a:lnRef idx="2">
+            <a:schemeClr val="accent1">
+              <a:shade val="50000"/>
+            </a:schemeClr>
+          </a:lnRef>
+          <a:fillRef idx="1">
+            <a:schemeClr val="accent1"/>
+          </a:fillRef>
+          <a:effectRef idx="0">
+            <a:schemeClr val="accent1"/>
+          </a:effectRef>
+          <a:fontRef idx="minor">
+            <a:schemeClr val="lt1"/>
+          </a:fontRef>
+        </p:style>
+        <p:txBody>
+          <a:bodyPr rtlCol="0" anchor="ctr"/>
+          <a:lstStyle/>
+          <a:p>
+            <a:pPr algn="ctr"/>
+            <a:endParaRPr lang="fr-BE"/>
+          </a:p>
+        </p:txBody>
+      </p:sp>
+      <p:sp>
+        <p:nvSpPr>
+          <p:cNvPr id="79" name="Oval 78">
+            <a:extLst>
+              <a:ext uri="{FF2B5EF4-FFF2-40B4-BE49-F238E27FC236}">
+                <a16:creationId xmlns:a16="http://schemas.microsoft.com/office/drawing/2014/main" id="{FED92D1A-1AE8-4D54-B3EF-24D3AEEDFC1A}"/>
+              </a:ext>
+            </a:extLst>
+          </p:cNvPr>
+          <p:cNvSpPr/>
+          <p:nvPr/>
+        </p:nvSpPr>
+        <p:spPr>
+          <a:xfrm>
+            <a:off x="7897172" y="3092834"/>
+            <a:ext cx="83376" cy="86450"/>
+          </a:xfrm>
+          <a:prstGeom prst="ellipse">
+            <a:avLst/>
+          </a:prstGeom>
+          <a:solidFill>
+            <a:schemeClr val="tx1">
+              <a:lumMod val="85000"/>
+              <a:lumOff val="15000"/>
+            </a:schemeClr>
+          </a:solidFill>
+          <a:ln>
+            <a:noFill/>
+          </a:ln>
+        </p:spPr>
+        <p:style>
+          <a:lnRef idx="2">
+            <a:schemeClr val="accent1">
+              <a:shade val="50000"/>
+            </a:schemeClr>
+          </a:lnRef>
+          <a:fillRef idx="1">
+            <a:schemeClr val="accent1"/>
+          </a:fillRef>
+          <a:effectRef idx="0">
+            <a:schemeClr val="accent1"/>
+          </a:effectRef>
+          <a:fontRef idx="minor">
+            <a:schemeClr val="lt1"/>
+          </a:fontRef>
+        </p:style>
+        <p:txBody>
+          <a:bodyPr rtlCol="0" anchor="ctr"/>
+          <a:lstStyle/>
+          <a:p>
+            <a:pPr algn="ctr"/>
+            <a:endParaRPr lang="fr-BE"/>
+          </a:p>
+        </p:txBody>
+      </p:sp>
+      <p:sp>
+        <p:nvSpPr>
+          <p:cNvPr id="80" name="Oval 79">
+            <a:extLst>
+              <a:ext uri="{FF2B5EF4-FFF2-40B4-BE49-F238E27FC236}">
+                <a16:creationId xmlns:a16="http://schemas.microsoft.com/office/drawing/2014/main" id="{47F8493F-3926-42B0-9DCF-AE91E2D3462A}"/>
+              </a:ext>
+            </a:extLst>
+          </p:cNvPr>
+          <p:cNvSpPr/>
+          <p:nvPr/>
+        </p:nvSpPr>
+        <p:spPr>
+          <a:xfrm>
+            <a:off x="8349397" y="2227412"/>
+            <a:ext cx="83376" cy="86450"/>
+          </a:xfrm>
+          <a:prstGeom prst="ellipse">
+            <a:avLst/>
+          </a:prstGeom>
+          <a:solidFill>
+            <a:schemeClr val="tx1">
+              <a:lumMod val="85000"/>
+              <a:lumOff val="15000"/>
+            </a:schemeClr>
+          </a:solidFill>
+          <a:ln>
+            <a:noFill/>
+          </a:ln>
+        </p:spPr>
+        <p:style>
+          <a:lnRef idx="2">
+            <a:schemeClr val="accent1">
+              <a:shade val="50000"/>
+            </a:schemeClr>
+          </a:lnRef>
+          <a:fillRef idx="1">
+            <a:schemeClr val="accent1"/>
+          </a:fillRef>
+          <a:effectRef idx="0">
+            <a:schemeClr val="accent1"/>
+          </a:effectRef>
+          <a:fontRef idx="minor">
+            <a:schemeClr val="lt1"/>
+          </a:fontRef>
+        </p:style>
+        <p:txBody>
+          <a:bodyPr rtlCol="0" anchor="ctr"/>
+          <a:lstStyle/>
+          <a:p>
+            <a:pPr algn="ctr"/>
+            <a:endParaRPr lang="fr-BE"/>
+          </a:p>
+        </p:txBody>
+      </p:sp>
+      <p:sp>
+        <p:nvSpPr>
+          <p:cNvPr id="81" name="Oval 80">
+            <a:extLst>
+              <a:ext uri="{FF2B5EF4-FFF2-40B4-BE49-F238E27FC236}">
+                <a16:creationId xmlns:a16="http://schemas.microsoft.com/office/drawing/2014/main" id="{0F0ACDB5-81A8-41B2-9CED-684A42BA4CF4}"/>
+              </a:ext>
+            </a:extLst>
+          </p:cNvPr>
+          <p:cNvSpPr/>
+          <p:nvPr/>
+        </p:nvSpPr>
+        <p:spPr>
+          <a:xfrm>
+            <a:off x="8662309" y="2548977"/>
+            <a:ext cx="83376" cy="86450"/>
+          </a:xfrm>
+          <a:prstGeom prst="ellipse">
+            <a:avLst/>
+          </a:prstGeom>
+          <a:solidFill>
+            <a:schemeClr val="tx1">
+              <a:lumMod val="85000"/>
+              <a:lumOff val="15000"/>
+            </a:schemeClr>
+          </a:solidFill>
+          <a:ln>
+            <a:noFill/>
+          </a:ln>
+        </p:spPr>
+        <p:style>
+          <a:lnRef idx="2">
+            <a:schemeClr val="accent1">
+              <a:shade val="50000"/>
+            </a:schemeClr>
+          </a:lnRef>
+          <a:fillRef idx="1">
+            <a:schemeClr val="accent1"/>
+          </a:fillRef>
+          <a:effectRef idx="0">
+            <a:schemeClr val="accent1"/>
+          </a:effectRef>
+          <a:fontRef idx="minor">
+            <a:schemeClr val="lt1"/>
+          </a:fontRef>
+        </p:style>
+        <p:txBody>
+          <a:bodyPr rtlCol="0" anchor="ctr"/>
+          <a:lstStyle/>
+          <a:p>
+            <a:pPr algn="ctr"/>
+            <a:endParaRPr lang="fr-BE"/>
+          </a:p>
+        </p:txBody>
+      </p:sp>
+      <p:grpSp>
+        <p:nvGrpSpPr>
+          <p:cNvPr id="82" name="Group 81">
+            <a:extLst>
+              <a:ext uri="{FF2B5EF4-FFF2-40B4-BE49-F238E27FC236}">
+                <a16:creationId xmlns:a16="http://schemas.microsoft.com/office/drawing/2014/main" id="{4A0A218C-D5D9-4CD1-A8B2-8B03534798FB}"/>
+              </a:ext>
+            </a:extLst>
+          </p:cNvPr>
+          <p:cNvGrpSpPr/>
+          <p:nvPr/>
+        </p:nvGrpSpPr>
+        <p:grpSpPr>
+          <a:xfrm>
+            <a:off x="7207716" y="1609421"/>
+            <a:ext cx="2121384" cy="2119132"/>
+            <a:chOff x="4322454" y="2326306"/>
+            <a:chExt cx="2121384" cy="2119132"/>
+          </a:xfrm>
+          <a:solidFill>
+            <a:srgbClr val="FF3737"/>
+          </a:solidFill>
+        </p:grpSpPr>
+        <p:grpSp>
+          <p:nvGrpSpPr>
+            <p:cNvPr id="83" name="Group 82">
+              <a:extLst>
+                <a:ext uri="{FF2B5EF4-FFF2-40B4-BE49-F238E27FC236}">
+                  <a16:creationId xmlns:a16="http://schemas.microsoft.com/office/drawing/2014/main" id="{CE252435-9754-401B-B3AA-9330608A25EE}"/>
+                </a:ext>
+              </a:extLst>
+            </p:cNvPr>
+            <p:cNvGrpSpPr/>
+            <p:nvPr/>
+          </p:nvGrpSpPr>
+          <p:grpSpPr>
+            <a:xfrm>
+              <a:off x="4871096" y="2326306"/>
+              <a:ext cx="1080000" cy="156845"/>
+              <a:chOff x="4860000" y="2304000"/>
+              <a:chExt cx="1080000" cy="156845"/>
+            </a:xfrm>
+            <a:grpFill/>
+          </p:grpSpPr>
+          <p:cxnSp>
+            <p:nvCxnSpPr>
+              <p:cNvPr id="109" name="Straight Connector 108">
+                <a:extLst>
+                  <a:ext uri="{FF2B5EF4-FFF2-40B4-BE49-F238E27FC236}">
+                    <a16:creationId xmlns:a16="http://schemas.microsoft.com/office/drawing/2014/main" id="{E0A5188C-2677-4B7A-AE76-F13BC6DE2A94}"/>
+                  </a:ext>
+                </a:extLst>
+              </p:cNvPr>
+              <p:cNvCxnSpPr/>
+              <p:nvPr/>
+            </p:nvCxnSpPr>
+            <p:spPr>
+              <a:xfrm flipV="1">
+                <a:off x="4860000" y="2304000"/>
+                <a:ext cx="0" cy="156845"/>
+              </a:xfrm>
+              <a:prstGeom prst="line">
+                <a:avLst/>
+              </a:prstGeom>
+              <a:grpFill/>
+              <a:ln w="76200" cap="rnd">
+                <a:solidFill>
+                  <a:schemeClr val="tx1">
+                    <a:lumMod val="85000"/>
+                    <a:lumOff val="15000"/>
+                  </a:schemeClr>
+                </a:solidFill>
+              </a:ln>
+            </p:spPr>
+            <p:style>
+              <a:lnRef idx="1">
+                <a:schemeClr val="accent1"/>
+              </a:lnRef>
+              <a:fillRef idx="0">
+                <a:schemeClr val="accent1"/>
+              </a:fillRef>
+              <a:effectRef idx="0">
+                <a:schemeClr val="accent1"/>
+              </a:effectRef>
+              <a:fontRef idx="minor">
+                <a:schemeClr val="tx1"/>
+              </a:fontRef>
+            </p:style>
+          </p:cxnSp>
+          <p:cxnSp>
+            <p:nvCxnSpPr>
+              <p:cNvPr id="110" name="Straight Connector 109">
+                <a:extLst>
+                  <a:ext uri="{FF2B5EF4-FFF2-40B4-BE49-F238E27FC236}">
+                    <a16:creationId xmlns:a16="http://schemas.microsoft.com/office/drawing/2014/main" id="{6B16E729-4BCF-4CEA-BD90-9203F85154E1}"/>
+                  </a:ext>
+                </a:extLst>
+              </p:cNvPr>
+              <p:cNvCxnSpPr/>
+              <p:nvPr/>
+            </p:nvCxnSpPr>
+            <p:spPr>
+              <a:xfrm flipV="1">
+                <a:off x="5040000" y="2304000"/>
+                <a:ext cx="0" cy="156845"/>
+              </a:xfrm>
+              <a:prstGeom prst="line">
+                <a:avLst/>
+              </a:prstGeom>
+              <a:grpFill/>
+              <a:ln w="76200" cap="rnd">
+                <a:solidFill>
+                  <a:schemeClr val="tx1">
+                    <a:lumMod val="85000"/>
+                    <a:lumOff val="15000"/>
+                  </a:schemeClr>
+                </a:solidFill>
+              </a:ln>
+            </p:spPr>
+            <p:style>
+              <a:lnRef idx="1">
+                <a:schemeClr val="accent1"/>
+              </a:lnRef>
+              <a:fillRef idx="0">
+                <a:schemeClr val="accent1"/>
+              </a:fillRef>
+              <a:effectRef idx="0">
+                <a:schemeClr val="accent1"/>
+              </a:effectRef>
+              <a:fontRef idx="minor">
+                <a:schemeClr val="tx1"/>
+              </a:fontRef>
+            </p:style>
+          </p:cxnSp>
+          <p:cxnSp>
+            <p:nvCxnSpPr>
+              <p:cNvPr id="111" name="Straight Connector 110">
+                <a:extLst>
+                  <a:ext uri="{FF2B5EF4-FFF2-40B4-BE49-F238E27FC236}">
+                    <a16:creationId xmlns:a16="http://schemas.microsoft.com/office/drawing/2014/main" id="{BBCA77F1-7765-410C-878E-CBAA9EB56E10}"/>
+                  </a:ext>
+                </a:extLst>
+              </p:cNvPr>
+              <p:cNvCxnSpPr/>
+              <p:nvPr/>
+            </p:nvCxnSpPr>
+            <p:spPr>
+              <a:xfrm flipV="1">
+                <a:off x="5220000" y="2304000"/>
+                <a:ext cx="0" cy="156845"/>
+              </a:xfrm>
+              <a:prstGeom prst="line">
+                <a:avLst/>
+              </a:prstGeom>
+              <a:grpFill/>
+              <a:ln w="76200" cap="rnd">
+                <a:solidFill>
+                  <a:schemeClr val="tx1">
+                    <a:lumMod val="85000"/>
+                    <a:lumOff val="15000"/>
+                  </a:schemeClr>
+                </a:solidFill>
+              </a:ln>
+            </p:spPr>
+            <p:style>
+              <a:lnRef idx="1">
+                <a:schemeClr val="accent1"/>
+              </a:lnRef>
+              <a:fillRef idx="0">
+                <a:schemeClr val="accent1"/>
+              </a:fillRef>
+              <a:effectRef idx="0">
+                <a:schemeClr val="accent1"/>
+              </a:effectRef>
+              <a:fontRef idx="minor">
+                <a:schemeClr val="tx1"/>
+              </a:fontRef>
+            </p:style>
+          </p:cxnSp>
+          <p:cxnSp>
+            <p:nvCxnSpPr>
+              <p:cNvPr id="112" name="Straight Connector 111">
+                <a:extLst>
+                  <a:ext uri="{FF2B5EF4-FFF2-40B4-BE49-F238E27FC236}">
+                    <a16:creationId xmlns:a16="http://schemas.microsoft.com/office/drawing/2014/main" id="{2877A6F6-03A1-4859-A39E-4BAD548F77B4}"/>
+                  </a:ext>
+                </a:extLst>
+              </p:cNvPr>
+              <p:cNvCxnSpPr/>
+              <p:nvPr/>
+            </p:nvCxnSpPr>
+            <p:spPr>
+              <a:xfrm flipV="1">
+                <a:off x="5400000" y="2304000"/>
+                <a:ext cx="0" cy="156845"/>
+              </a:xfrm>
+              <a:prstGeom prst="line">
+                <a:avLst/>
+              </a:prstGeom>
+              <a:grpFill/>
+              <a:ln w="76200" cap="rnd">
+                <a:solidFill>
+                  <a:schemeClr val="tx1">
+                    <a:lumMod val="85000"/>
+                    <a:lumOff val="15000"/>
+                  </a:schemeClr>
+                </a:solidFill>
+              </a:ln>
+            </p:spPr>
+            <p:style>
+              <a:lnRef idx="1">
+                <a:schemeClr val="accent1"/>
+              </a:lnRef>
+              <a:fillRef idx="0">
+                <a:schemeClr val="accent1"/>
+              </a:fillRef>
+              <a:effectRef idx="0">
+                <a:schemeClr val="accent1"/>
+              </a:effectRef>
+              <a:fontRef idx="minor">
+                <a:schemeClr val="tx1"/>
+              </a:fontRef>
+            </p:style>
+          </p:cxnSp>
+          <p:cxnSp>
+            <p:nvCxnSpPr>
+              <p:cNvPr id="113" name="Straight Connector 112">
+                <a:extLst>
+                  <a:ext uri="{FF2B5EF4-FFF2-40B4-BE49-F238E27FC236}">
+                    <a16:creationId xmlns:a16="http://schemas.microsoft.com/office/drawing/2014/main" id="{89F2E71B-F64B-4CAE-A30C-5490F99B31A0}"/>
+                  </a:ext>
+                </a:extLst>
+              </p:cNvPr>
+              <p:cNvCxnSpPr/>
+              <p:nvPr/>
+            </p:nvCxnSpPr>
+            <p:spPr>
+              <a:xfrm flipV="1">
+                <a:off x="5580000" y="2304000"/>
+                <a:ext cx="0" cy="156845"/>
+              </a:xfrm>
+              <a:prstGeom prst="line">
+                <a:avLst/>
+              </a:prstGeom>
+              <a:grpFill/>
+              <a:ln w="76200" cap="rnd">
+                <a:solidFill>
+                  <a:schemeClr val="tx1">
+                    <a:lumMod val="85000"/>
+                    <a:lumOff val="15000"/>
+                  </a:schemeClr>
+                </a:solidFill>
+              </a:ln>
+            </p:spPr>
+            <p:style>
+              <a:lnRef idx="1">
+                <a:schemeClr val="accent1"/>
+              </a:lnRef>
+              <a:fillRef idx="0">
+                <a:schemeClr val="accent1"/>
+              </a:fillRef>
+              <a:effectRef idx="0">
+                <a:schemeClr val="accent1"/>
+              </a:effectRef>
+              <a:fontRef idx="minor">
+                <a:schemeClr val="tx1"/>
+              </a:fontRef>
+            </p:style>
+          </p:cxnSp>
+          <p:cxnSp>
+            <p:nvCxnSpPr>
+              <p:cNvPr id="114" name="Straight Connector 113">
+                <a:extLst>
+                  <a:ext uri="{FF2B5EF4-FFF2-40B4-BE49-F238E27FC236}">
+                    <a16:creationId xmlns:a16="http://schemas.microsoft.com/office/drawing/2014/main" id="{9FC3CBDC-20FC-4E99-8E69-2DEDBE480992}"/>
+                  </a:ext>
+                </a:extLst>
+              </p:cNvPr>
+              <p:cNvCxnSpPr/>
+              <p:nvPr/>
+            </p:nvCxnSpPr>
+            <p:spPr>
+              <a:xfrm flipV="1">
+                <a:off x="5760000" y="2304000"/>
+                <a:ext cx="0" cy="156845"/>
+              </a:xfrm>
+              <a:prstGeom prst="line">
+                <a:avLst/>
+              </a:prstGeom>
+              <a:grpFill/>
+              <a:ln w="76200" cap="rnd">
+                <a:solidFill>
+                  <a:schemeClr val="tx1">
+                    <a:lumMod val="85000"/>
+                    <a:lumOff val="15000"/>
+                  </a:schemeClr>
+                </a:solidFill>
+              </a:ln>
+            </p:spPr>
+            <p:style>
+              <a:lnRef idx="1">
+                <a:schemeClr val="accent1"/>
+              </a:lnRef>
+              <a:fillRef idx="0">
+                <a:schemeClr val="accent1"/>
+              </a:fillRef>
+              <a:effectRef idx="0">
+                <a:schemeClr val="accent1"/>
+              </a:effectRef>
+              <a:fontRef idx="minor">
+                <a:schemeClr val="tx1"/>
+              </a:fontRef>
+            </p:style>
+          </p:cxnSp>
+          <p:cxnSp>
+            <p:nvCxnSpPr>
+              <p:cNvPr id="115" name="Straight Connector 114">
+                <a:extLst>
+                  <a:ext uri="{FF2B5EF4-FFF2-40B4-BE49-F238E27FC236}">
+                    <a16:creationId xmlns:a16="http://schemas.microsoft.com/office/drawing/2014/main" id="{3EF39CE2-5E55-4C95-B249-CE6DAB48184F}"/>
+                  </a:ext>
+                </a:extLst>
+              </p:cNvPr>
+              <p:cNvCxnSpPr/>
+              <p:nvPr/>
+            </p:nvCxnSpPr>
+            <p:spPr>
+              <a:xfrm flipV="1">
+                <a:off x="5940000" y="2304000"/>
+                <a:ext cx="0" cy="156845"/>
+              </a:xfrm>
+              <a:prstGeom prst="line">
+                <a:avLst/>
+              </a:prstGeom>
+              <a:grpFill/>
+              <a:ln w="76200" cap="rnd">
+                <a:solidFill>
+                  <a:schemeClr val="tx1">
+                    <a:lumMod val="85000"/>
+                    <a:lumOff val="15000"/>
+                  </a:schemeClr>
+                </a:solidFill>
+              </a:ln>
+            </p:spPr>
+            <p:style>
+              <a:lnRef idx="1">
+                <a:schemeClr val="accent1"/>
+              </a:lnRef>
+              <a:fillRef idx="0">
+                <a:schemeClr val="accent1"/>
+              </a:fillRef>
+              <a:effectRef idx="0">
+                <a:schemeClr val="accent1"/>
+              </a:effectRef>
+              <a:fontRef idx="minor">
+                <a:schemeClr val="tx1"/>
+              </a:fontRef>
+            </p:style>
+          </p:cxnSp>
+        </p:grpSp>
+        <p:grpSp>
+          <p:nvGrpSpPr>
+            <p:cNvPr id="84" name="Group 83">
+              <a:extLst>
+                <a:ext uri="{FF2B5EF4-FFF2-40B4-BE49-F238E27FC236}">
+                  <a16:creationId xmlns:a16="http://schemas.microsoft.com/office/drawing/2014/main" id="{45706DD4-C703-40D5-BD78-659CF7EA3DCA}"/>
+                </a:ext>
+              </a:extLst>
+            </p:cNvPr>
+            <p:cNvGrpSpPr/>
+            <p:nvPr/>
+          </p:nvGrpSpPr>
+          <p:grpSpPr>
+            <a:xfrm rot="5400000">
+              <a:off x="5825416" y="3285860"/>
+              <a:ext cx="1080000" cy="156845"/>
+              <a:chOff x="4860000" y="2304000"/>
+              <a:chExt cx="1080000" cy="156845"/>
+            </a:xfrm>
+            <a:grpFill/>
+          </p:grpSpPr>
+          <p:cxnSp>
+            <p:nvCxnSpPr>
+              <p:cNvPr id="102" name="Straight Connector 101">
+                <a:extLst>
+                  <a:ext uri="{FF2B5EF4-FFF2-40B4-BE49-F238E27FC236}">
+                    <a16:creationId xmlns:a16="http://schemas.microsoft.com/office/drawing/2014/main" id="{7D6964D0-BABC-4FFA-AC1D-6D0048F586E4}"/>
+                  </a:ext>
+                </a:extLst>
+              </p:cNvPr>
+              <p:cNvCxnSpPr/>
+              <p:nvPr/>
+            </p:nvCxnSpPr>
+            <p:spPr>
+              <a:xfrm flipV="1">
+                <a:off x="4860000" y="2304000"/>
+                <a:ext cx="0" cy="156845"/>
+              </a:xfrm>
+              <a:prstGeom prst="line">
+                <a:avLst/>
+              </a:prstGeom>
+              <a:grpFill/>
+              <a:ln w="76200" cap="rnd">
+                <a:solidFill>
+                  <a:schemeClr val="tx1">
+                    <a:lumMod val="85000"/>
+                    <a:lumOff val="15000"/>
+                  </a:schemeClr>
+                </a:solidFill>
+              </a:ln>
+            </p:spPr>
+            <p:style>
+              <a:lnRef idx="1">
+                <a:schemeClr val="accent1"/>
+              </a:lnRef>
+              <a:fillRef idx="0">
+                <a:schemeClr val="accent1"/>
+              </a:fillRef>
+              <a:effectRef idx="0">
+                <a:schemeClr val="accent1"/>
+              </a:effectRef>
+              <a:fontRef idx="minor">
+                <a:schemeClr val="tx1"/>
+              </a:fontRef>
+            </p:style>
+          </p:cxnSp>
+          <p:cxnSp>
+            <p:nvCxnSpPr>
+              <p:cNvPr id="103" name="Straight Connector 102">
+                <a:extLst>
+                  <a:ext uri="{FF2B5EF4-FFF2-40B4-BE49-F238E27FC236}">
+                    <a16:creationId xmlns:a16="http://schemas.microsoft.com/office/drawing/2014/main" id="{488E17E3-F048-4BFC-B684-2911ED7D6D07}"/>
+                  </a:ext>
+                </a:extLst>
+              </p:cNvPr>
+              <p:cNvCxnSpPr/>
+              <p:nvPr/>
+            </p:nvCxnSpPr>
+            <p:spPr>
+              <a:xfrm flipV="1">
+                <a:off x="5040000" y="2304000"/>
+                <a:ext cx="0" cy="156845"/>
+              </a:xfrm>
+              <a:prstGeom prst="line">
+                <a:avLst/>
+              </a:prstGeom>
+              <a:grpFill/>
+              <a:ln w="76200" cap="rnd">
+                <a:solidFill>
+                  <a:schemeClr val="tx1">
+                    <a:lumMod val="85000"/>
+                    <a:lumOff val="15000"/>
+                  </a:schemeClr>
+                </a:solidFill>
+              </a:ln>
+            </p:spPr>
+            <p:style>
+              <a:lnRef idx="1">
+                <a:schemeClr val="accent1"/>
+              </a:lnRef>
+              <a:fillRef idx="0">
+                <a:schemeClr val="accent1"/>
+              </a:fillRef>
+              <a:effectRef idx="0">
+                <a:schemeClr val="accent1"/>
+              </a:effectRef>
+              <a:fontRef idx="minor">
+                <a:schemeClr val="tx1"/>
+              </a:fontRef>
+            </p:style>
+          </p:cxnSp>
+          <p:cxnSp>
+            <p:nvCxnSpPr>
+              <p:cNvPr id="104" name="Straight Connector 103">
+                <a:extLst>
+                  <a:ext uri="{FF2B5EF4-FFF2-40B4-BE49-F238E27FC236}">
+                    <a16:creationId xmlns:a16="http://schemas.microsoft.com/office/drawing/2014/main" id="{100B48AC-D28B-4AC7-B199-5C6F7F629950}"/>
+                  </a:ext>
+                </a:extLst>
+              </p:cNvPr>
+              <p:cNvCxnSpPr/>
+              <p:nvPr/>
+            </p:nvCxnSpPr>
+            <p:spPr>
+              <a:xfrm flipV="1">
+                <a:off x="5220000" y="2304000"/>
+                <a:ext cx="0" cy="156845"/>
+              </a:xfrm>
+              <a:prstGeom prst="line">
+                <a:avLst/>
+              </a:prstGeom>
+              <a:grpFill/>
+              <a:ln w="76200" cap="rnd">
+                <a:solidFill>
+                  <a:schemeClr val="tx1">
+                    <a:lumMod val="85000"/>
+                    <a:lumOff val="15000"/>
+                  </a:schemeClr>
+                </a:solidFill>
+              </a:ln>
+            </p:spPr>
+            <p:style>
+              <a:lnRef idx="1">
+                <a:schemeClr val="accent1"/>
+              </a:lnRef>
+              <a:fillRef idx="0">
+                <a:schemeClr val="accent1"/>
+              </a:fillRef>
+              <a:effectRef idx="0">
+                <a:schemeClr val="accent1"/>
+              </a:effectRef>
+              <a:fontRef idx="minor">
+                <a:schemeClr val="tx1"/>
+              </a:fontRef>
+            </p:style>
+          </p:cxnSp>
+          <p:cxnSp>
+            <p:nvCxnSpPr>
+              <p:cNvPr id="105" name="Straight Connector 104">
+                <a:extLst>
+                  <a:ext uri="{FF2B5EF4-FFF2-40B4-BE49-F238E27FC236}">
+                    <a16:creationId xmlns:a16="http://schemas.microsoft.com/office/drawing/2014/main" id="{DFEC550A-C29C-4688-A271-B08A8F2E7149}"/>
+                  </a:ext>
+                </a:extLst>
+              </p:cNvPr>
+              <p:cNvCxnSpPr/>
+              <p:nvPr/>
+            </p:nvCxnSpPr>
+            <p:spPr>
+              <a:xfrm flipV="1">
+                <a:off x="5400000" y="2304000"/>
+                <a:ext cx="0" cy="156845"/>
+              </a:xfrm>
+              <a:prstGeom prst="line">
+                <a:avLst/>
+              </a:prstGeom>
+              <a:grpFill/>
+              <a:ln w="76200" cap="rnd">
+                <a:solidFill>
+                  <a:schemeClr val="tx1">
+                    <a:lumMod val="85000"/>
+                    <a:lumOff val="15000"/>
+                  </a:schemeClr>
+                </a:solidFill>
+              </a:ln>
+            </p:spPr>
+            <p:style>
+              <a:lnRef idx="1">
+                <a:schemeClr val="accent1"/>
+              </a:lnRef>
+              <a:fillRef idx="0">
+                <a:schemeClr val="accent1"/>
+              </a:fillRef>
+              <a:effectRef idx="0">
+                <a:schemeClr val="accent1"/>
+              </a:effectRef>
+              <a:fontRef idx="minor">
+                <a:schemeClr val="tx1"/>
+              </a:fontRef>
+            </p:style>
+          </p:cxnSp>
+          <p:cxnSp>
+            <p:nvCxnSpPr>
+              <p:cNvPr id="106" name="Straight Connector 105">
+                <a:extLst>
+                  <a:ext uri="{FF2B5EF4-FFF2-40B4-BE49-F238E27FC236}">
+                    <a16:creationId xmlns:a16="http://schemas.microsoft.com/office/drawing/2014/main" id="{3AA886D6-6962-4E34-8D39-41DDEBBF8952}"/>
+                  </a:ext>
+                </a:extLst>
+              </p:cNvPr>
+              <p:cNvCxnSpPr/>
+              <p:nvPr/>
+            </p:nvCxnSpPr>
+            <p:spPr>
+              <a:xfrm flipV="1">
+                <a:off x="5580000" y="2304000"/>
+                <a:ext cx="0" cy="156845"/>
+              </a:xfrm>
+              <a:prstGeom prst="line">
+                <a:avLst/>
+              </a:prstGeom>
+              <a:grpFill/>
+              <a:ln w="76200" cap="rnd">
+                <a:solidFill>
+                  <a:schemeClr val="tx1">
+                    <a:lumMod val="85000"/>
+                    <a:lumOff val="15000"/>
+                  </a:schemeClr>
+                </a:solidFill>
+              </a:ln>
+            </p:spPr>
+            <p:style>
+              <a:lnRef idx="1">
+                <a:schemeClr val="accent1"/>
+              </a:lnRef>
+              <a:fillRef idx="0">
+                <a:schemeClr val="accent1"/>
+              </a:fillRef>
+              <a:effectRef idx="0">
+                <a:schemeClr val="accent1"/>
+              </a:effectRef>
+              <a:fontRef idx="minor">
+                <a:schemeClr val="tx1"/>
+              </a:fontRef>
+            </p:style>
+          </p:cxnSp>
+          <p:cxnSp>
+            <p:nvCxnSpPr>
+              <p:cNvPr id="107" name="Straight Connector 106">
+                <a:extLst>
+                  <a:ext uri="{FF2B5EF4-FFF2-40B4-BE49-F238E27FC236}">
+                    <a16:creationId xmlns:a16="http://schemas.microsoft.com/office/drawing/2014/main" id="{3B84D497-D41A-4C4B-9E7B-569D716625A5}"/>
+                  </a:ext>
+                </a:extLst>
+              </p:cNvPr>
+              <p:cNvCxnSpPr/>
+              <p:nvPr/>
+            </p:nvCxnSpPr>
+            <p:spPr>
+              <a:xfrm flipV="1">
+                <a:off x="5760000" y="2304000"/>
+                <a:ext cx="0" cy="156845"/>
+              </a:xfrm>
+              <a:prstGeom prst="line">
+                <a:avLst/>
+              </a:prstGeom>
+              <a:grpFill/>
+              <a:ln w="76200" cap="rnd">
+                <a:solidFill>
+                  <a:schemeClr val="tx1">
+                    <a:lumMod val="85000"/>
+                    <a:lumOff val="15000"/>
+                  </a:schemeClr>
+                </a:solidFill>
+              </a:ln>
+            </p:spPr>
+            <p:style>
+              <a:lnRef idx="1">
+                <a:schemeClr val="accent1"/>
+              </a:lnRef>
+              <a:fillRef idx="0">
+                <a:schemeClr val="accent1"/>
+              </a:fillRef>
+              <a:effectRef idx="0">
+                <a:schemeClr val="accent1"/>
+              </a:effectRef>
+              <a:fontRef idx="minor">
+                <a:schemeClr val="tx1"/>
+              </a:fontRef>
+            </p:style>
+          </p:cxnSp>
+          <p:cxnSp>
+            <p:nvCxnSpPr>
+              <p:cNvPr id="108" name="Straight Connector 107">
+                <a:extLst>
+                  <a:ext uri="{FF2B5EF4-FFF2-40B4-BE49-F238E27FC236}">
+                    <a16:creationId xmlns:a16="http://schemas.microsoft.com/office/drawing/2014/main" id="{A240644A-F588-42D4-AB03-E9BDDF850D4A}"/>
+                  </a:ext>
+                </a:extLst>
+              </p:cNvPr>
+              <p:cNvCxnSpPr/>
+              <p:nvPr/>
+            </p:nvCxnSpPr>
+            <p:spPr>
+              <a:xfrm flipV="1">
+                <a:off x="5940000" y="2304000"/>
+                <a:ext cx="0" cy="156845"/>
+              </a:xfrm>
+              <a:prstGeom prst="line">
+                <a:avLst/>
+              </a:prstGeom>
+              <a:grpFill/>
+              <a:ln w="76200" cap="rnd">
+                <a:solidFill>
+                  <a:schemeClr val="tx1">
+                    <a:lumMod val="85000"/>
+                    <a:lumOff val="15000"/>
+                  </a:schemeClr>
+                </a:solidFill>
+              </a:ln>
+            </p:spPr>
+            <p:style>
+              <a:lnRef idx="1">
+                <a:schemeClr val="accent1"/>
+              </a:lnRef>
+              <a:fillRef idx="0">
+                <a:schemeClr val="accent1"/>
+              </a:fillRef>
+              <a:effectRef idx="0">
+                <a:schemeClr val="accent1"/>
+              </a:effectRef>
+              <a:fontRef idx="minor">
+                <a:schemeClr val="tx1"/>
+              </a:fontRef>
+            </p:style>
+          </p:cxnSp>
+        </p:grpSp>
+        <p:grpSp>
+          <p:nvGrpSpPr>
+            <p:cNvPr id="85" name="Group 84">
+              <a:extLst>
+                <a:ext uri="{FF2B5EF4-FFF2-40B4-BE49-F238E27FC236}">
+                  <a16:creationId xmlns:a16="http://schemas.microsoft.com/office/drawing/2014/main" id="{CCB242CA-F545-42A1-ADBD-0F7541ECE1BC}"/>
+                </a:ext>
+              </a:extLst>
+            </p:cNvPr>
+            <p:cNvGrpSpPr/>
+            <p:nvPr/>
+          </p:nvGrpSpPr>
+          <p:grpSpPr>
+            <a:xfrm>
+              <a:off x="4844370" y="4288593"/>
+              <a:ext cx="1080000" cy="156845"/>
+              <a:chOff x="4860000" y="2304000"/>
+              <a:chExt cx="1080000" cy="156845"/>
+            </a:xfrm>
+            <a:grpFill/>
+          </p:grpSpPr>
+          <p:cxnSp>
+            <p:nvCxnSpPr>
+              <p:cNvPr id="95" name="Straight Connector 94">
+                <a:extLst>
+                  <a:ext uri="{FF2B5EF4-FFF2-40B4-BE49-F238E27FC236}">
+                    <a16:creationId xmlns:a16="http://schemas.microsoft.com/office/drawing/2014/main" id="{EC6ADEF8-30B3-42EF-80B0-FBFEE74F8742}"/>
+                  </a:ext>
+                </a:extLst>
+              </p:cNvPr>
+              <p:cNvCxnSpPr/>
+              <p:nvPr/>
+            </p:nvCxnSpPr>
+            <p:spPr>
+              <a:xfrm flipV="1">
+                <a:off x="4860000" y="2304000"/>
+                <a:ext cx="0" cy="156845"/>
+              </a:xfrm>
+              <a:prstGeom prst="line">
+                <a:avLst/>
+              </a:prstGeom>
+              <a:grpFill/>
+              <a:ln w="76200" cap="rnd">
+                <a:solidFill>
+                  <a:schemeClr val="tx1">
+                    <a:lumMod val="85000"/>
+                    <a:lumOff val="15000"/>
+                  </a:schemeClr>
+                </a:solidFill>
+              </a:ln>
+            </p:spPr>
+            <p:style>
+              <a:lnRef idx="1">
+                <a:schemeClr val="accent1"/>
+              </a:lnRef>
+              <a:fillRef idx="0">
+                <a:schemeClr val="accent1"/>
+              </a:fillRef>
+              <a:effectRef idx="0">
+                <a:schemeClr val="accent1"/>
+              </a:effectRef>
+              <a:fontRef idx="minor">
+                <a:schemeClr val="tx1"/>
+              </a:fontRef>
+            </p:style>
+          </p:cxnSp>
+          <p:cxnSp>
+            <p:nvCxnSpPr>
+              <p:cNvPr id="96" name="Straight Connector 95">
+                <a:extLst>
+                  <a:ext uri="{FF2B5EF4-FFF2-40B4-BE49-F238E27FC236}">
+                    <a16:creationId xmlns:a16="http://schemas.microsoft.com/office/drawing/2014/main" id="{066EEEE9-E3F2-4250-A9B0-55EF2EB28C4B}"/>
+                  </a:ext>
+                </a:extLst>
+              </p:cNvPr>
+              <p:cNvCxnSpPr/>
+              <p:nvPr/>
+            </p:nvCxnSpPr>
+            <p:spPr>
+              <a:xfrm flipV="1">
+                <a:off x="5040000" y="2304000"/>
+                <a:ext cx="0" cy="156845"/>
+              </a:xfrm>
+              <a:prstGeom prst="line">
+                <a:avLst/>
+              </a:prstGeom>
+              <a:grpFill/>
+              <a:ln w="76200" cap="rnd">
+                <a:solidFill>
+                  <a:schemeClr val="tx1">
+                    <a:lumMod val="85000"/>
+                    <a:lumOff val="15000"/>
+                  </a:schemeClr>
+                </a:solidFill>
+              </a:ln>
+            </p:spPr>
+            <p:style>
+              <a:lnRef idx="1">
+                <a:schemeClr val="accent1"/>
+              </a:lnRef>
+              <a:fillRef idx="0">
+                <a:schemeClr val="accent1"/>
+              </a:fillRef>
+              <a:effectRef idx="0">
+                <a:schemeClr val="accent1"/>
+              </a:effectRef>
+              <a:fontRef idx="minor">
+                <a:schemeClr val="tx1"/>
+              </a:fontRef>
+            </p:style>
+          </p:cxnSp>
+          <p:cxnSp>
+            <p:nvCxnSpPr>
+              <p:cNvPr id="97" name="Straight Connector 96">
+                <a:extLst>
+                  <a:ext uri="{FF2B5EF4-FFF2-40B4-BE49-F238E27FC236}">
+                    <a16:creationId xmlns:a16="http://schemas.microsoft.com/office/drawing/2014/main" id="{9D8952E9-20D4-4852-A92F-D3CD4F410ACA}"/>
+                  </a:ext>
+                </a:extLst>
+              </p:cNvPr>
+              <p:cNvCxnSpPr/>
+              <p:nvPr/>
+            </p:nvCxnSpPr>
+            <p:spPr>
+              <a:xfrm flipV="1">
+                <a:off x="5220000" y="2304000"/>
+                <a:ext cx="0" cy="156845"/>
+              </a:xfrm>
+              <a:prstGeom prst="line">
+                <a:avLst/>
+              </a:prstGeom>
+              <a:grpFill/>
+              <a:ln w="76200" cap="rnd">
+                <a:solidFill>
+                  <a:schemeClr val="tx1">
+                    <a:lumMod val="85000"/>
+                    <a:lumOff val="15000"/>
+                  </a:schemeClr>
+                </a:solidFill>
+              </a:ln>
+            </p:spPr>
+            <p:style>
+              <a:lnRef idx="1">
+                <a:schemeClr val="accent1"/>
+              </a:lnRef>
+              <a:fillRef idx="0">
+                <a:schemeClr val="accent1"/>
+              </a:fillRef>
+              <a:effectRef idx="0">
+                <a:schemeClr val="accent1"/>
+              </a:effectRef>
+              <a:fontRef idx="minor">
+                <a:schemeClr val="tx1"/>
+              </a:fontRef>
+            </p:style>
+          </p:cxnSp>
+          <p:cxnSp>
+            <p:nvCxnSpPr>
+              <p:cNvPr id="98" name="Straight Connector 97">
+                <a:extLst>
+                  <a:ext uri="{FF2B5EF4-FFF2-40B4-BE49-F238E27FC236}">
+                    <a16:creationId xmlns:a16="http://schemas.microsoft.com/office/drawing/2014/main" id="{02D4527B-E8BE-499C-8932-218DF0B51A72}"/>
+                  </a:ext>
+                </a:extLst>
+              </p:cNvPr>
+              <p:cNvCxnSpPr/>
+              <p:nvPr/>
+            </p:nvCxnSpPr>
+            <p:spPr>
+              <a:xfrm flipV="1">
+                <a:off x="5400000" y="2304000"/>
+                <a:ext cx="0" cy="156845"/>
+              </a:xfrm>
+              <a:prstGeom prst="line">
+                <a:avLst/>
+              </a:prstGeom>
+              <a:grpFill/>
+              <a:ln w="76200" cap="rnd">
+                <a:solidFill>
+                  <a:schemeClr val="tx1">
+                    <a:lumMod val="85000"/>
+                    <a:lumOff val="15000"/>
+                  </a:schemeClr>
+                </a:solidFill>
+              </a:ln>
+            </p:spPr>
+            <p:style>
+              <a:lnRef idx="1">
+                <a:schemeClr val="accent1"/>
+              </a:lnRef>
+              <a:fillRef idx="0">
+                <a:schemeClr val="accent1"/>
+              </a:fillRef>
+              <a:effectRef idx="0">
+                <a:schemeClr val="accent1"/>
+              </a:effectRef>
+              <a:fontRef idx="minor">
+                <a:schemeClr val="tx1"/>
+              </a:fontRef>
+            </p:style>
+          </p:cxnSp>
+          <p:cxnSp>
+            <p:nvCxnSpPr>
+              <p:cNvPr id="99" name="Straight Connector 98">
+                <a:extLst>
+                  <a:ext uri="{FF2B5EF4-FFF2-40B4-BE49-F238E27FC236}">
+                    <a16:creationId xmlns:a16="http://schemas.microsoft.com/office/drawing/2014/main" id="{F8B451E4-EC54-404B-91EE-634E9B4D880D}"/>
+                  </a:ext>
+                </a:extLst>
+              </p:cNvPr>
+              <p:cNvCxnSpPr/>
+              <p:nvPr/>
+            </p:nvCxnSpPr>
+            <p:spPr>
+              <a:xfrm flipV="1">
+                <a:off x="5580000" y="2304000"/>
+                <a:ext cx="0" cy="156845"/>
+              </a:xfrm>
+              <a:prstGeom prst="line">
+                <a:avLst/>
+              </a:prstGeom>
+              <a:grpFill/>
+              <a:ln w="76200" cap="rnd">
+                <a:solidFill>
+                  <a:schemeClr val="tx1">
+                    <a:lumMod val="85000"/>
+                    <a:lumOff val="15000"/>
+                  </a:schemeClr>
+                </a:solidFill>
+              </a:ln>
+            </p:spPr>
+            <p:style>
+              <a:lnRef idx="1">
+                <a:schemeClr val="accent1"/>
+              </a:lnRef>
+              <a:fillRef idx="0">
+                <a:schemeClr val="accent1"/>
+              </a:fillRef>
+              <a:effectRef idx="0">
+                <a:schemeClr val="accent1"/>
+              </a:effectRef>
+              <a:fontRef idx="minor">
+                <a:schemeClr val="tx1"/>
+              </a:fontRef>
+            </p:style>
+          </p:cxnSp>
+          <p:cxnSp>
+            <p:nvCxnSpPr>
+              <p:cNvPr id="100" name="Straight Connector 99">
+                <a:extLst>
+                  <a:ext uri="{FF2B5EF4-FFF2-40B4-BE49-F238E27FC236}">
+                    <a16:creationId xmlns:a16="http://schemas.microsoft.com/office/drawing/2014/main" id="{B96F3C26-6A31-4AE3-A5BC-CD03A97B62E8}"/>
+                  </a:ext>
+                </a:extLst>
+              </p:cNvPr>
+              <p:cNvCxnSpPr/>
+              <p:nvPr/>
+            </p:nvCxnSpPr>
+            <p:spPr>
+              <a:xfrm flipV="1">
+                <a:off x="5760000" y="2304000"/>
+                <a:ext cx="0" cy="156845"/>
+              </a:xfrm>
+              <a:prstGeom prst="line">
+                <a:avLst/>
+              </a:prstGeom>
+              <a:grpFill/>
+              <a:ln w="76200" cap="rnd">
+                <a:solidFill>
+                  <a:schemeClr val="tx1">
+                    <a:lumMod val="85000"/>
+                    <a:lumOff val="15000"/>
+                  </a:schemeClr>
+                </a:solidFill>
+              </a:ln>
+            </p:spPr>
+            <p:style>
+              <a:lnRef idx="1">
+                <a:schemeClr val="accent1"/>
+              </a:lnRef>
+              <a:fillRef idx="0">
+                <a:schemeClr val="accent1"/>
+              </a:fillRef>
+              <a:effectRef idx="0">
+                <a:schemeClr val="accent1"/>
+              </a:effectRef>
+              <a:fontRef idx="minor">
+                <a:schemeClr val="tx1"/>
+              </a:fontRef>
+            </p:style>
+          </p:cxnSp>
+          <p:cxnSp>
+            <p:nvCxnSpPr>
+              <p:cNvPr id="101" name="Straight Connector 100">
+                <a:extLst>
+                  <a:ext uri="{FF2B5EF4-FFF2-40B4-BE49-F238E27FC236}">
+                    <a16:creationId xmlns:a16="http://schemas.microsoft.com/office/drawing/2014/main" id="{39FF402B-BAB1-4CFE-94AB-D7EF810313B7}"/>
+                  </a:ext>
+                </a:extLst>
+              </p:cNvPr>
+              <p:cNvCxnSpPr/>
+              <p:nvPr/>
+            </p:nvCxnSpPr>
+            <p:spPr>
+              <a:xfrm flipV="1">
+                <a:off x="5940000" y="2304000"/>
+                <a:ext cx="0" cy="156845"/>
+              </a:xfrm>
+              <a:prstGeom prst="line">
+                <a:avLst/>
+              </a:prstGeom>
+              <a:grpFill/>
+              <a:ln w="76200" cap="rnd">
+                <a:solidFill>
+                  <a:schemeClr val="tx1">
+                    <a:lumMod val="85000"/>
+                    <a:lumOff val="15000"/>
+                  </a:schemeClr>
+                </a:solidFill>
+              </a:ln>
+            </p:spPr>
+            <p:style>
+              <a:lnRef idx="1">
+                <a:schemeClr val="accent1"/>
+              </a:lnRef>
+              <a:fillRef idx="0">
+                <a:schemeClr val="accent1"/>
+              </a:fillRef>
+              <a:effectRef idx="0">
+                <a:schemeClr val="accent1"/>
+              </a:effectRef>
+              <a:fontRef idx="minor">
+                <a:schemeClr val="tx1"/>
+              </a:fontRef>
+            </p:style>
+          </p:cxnSp>
+        </p:grpSp>
+        <p:grpSp>
+          <p:nvGrpSpPr>
+            <p:cNvPr id="86" name="Group 85">
+              <a:extLst>
+                <a:ext uri="{FF2B5EF4-FFF2-40B4-BE49-F238E27FC236}">
+                  <a16:creationId xmlns:a16="http://schemas.microsoft.com/office/drawing/2014/main" id="{82746F72-FE07-480B-8EBE-779EA1C33E01}"/>
+                </a:ext>
+              </a:extLst>
+            </p:cNvPr>
+            <p:cNvGrpSpPr/>
+            <p:nvPr/>
+          </p:nvGrpSpPr>
+          <p:grpSpPr>
+            <a:xfrm rot="5400000">
+              <a:off x="3860877" y="3307603"/>
+              <a:ext cx="1080000" cy="156845"/>
+              <a:chOff x="4860000" y="2304000"/>
+              <a:chExt cx="1080000" cy="156845"/>
+            </a:xfrm>
+            <a:grpFill/>
+          </p:grpSpPr>
+          <p:cxnSp>
+            <p:nvCxnSpPr>
+              <p:cNvPr id="88" name="Straight Connector 87">
+                <a:extLst>
+                  <a:ext uri="{FF2B5EF4-FFF2-40B4-BE49-F238E27FC236}">
+                    <a16:creationId xmlns:a16="http://schemas.microsoft.com/office/drawing/2014/main" id="{83349F04-3AF9-41BF-956D-4E105E8145C7}"/>
+                  </a:ext>
+                </a:extLst>
+              </p:cNvPr>
+              <p:cNvCxnSpPr/>
+              <p:nvPr/>
+            </p:nvCxnSpPr>
+            <p:spPr>
+              <a:xfrm flipV="1">
+                <a:off x="4860000" y="2304000"/>
+                <a:ext cx="0" cy="156845"/>
+              </a:xfrm>
+              <a:prstGeom prst="line">
+                <a:avLst/>
+              </a:prstGeom>
+              <a:grpFill/>
+              <a:ln w="76200" cap="rnd">
+                <a:solidFill>
+                  <a:schemeClr val="tx1">
+                    <a:lumMod val="85000"/>
+                    <a:lumOff val="15000"/>
+                  </a:schemeClr>
+                </a:solidFill>
+              </a:ln>
+            </p:spPr>
+            <p:style>
+              <a:lnRef idx="1">
+                <a:schemeClr val="accent1"/>
+              </a:lnRef>
+              <a:fillRef idx="0">
+                <a:schemeClr val="accent1"/>
+              </a:fillRef>
+              <a:effectRef idx="0">
+                <a:schemeClr val="accent1"/>
+              </a:effectRef>
+              <a:fontRef idx="minor">
+                <a:schemeClr val="tx1"/>
+              </a:fontRef>
+            </p:style>
+          </p:cxnSp>
+          <p:cxnSp>
+            <p:nvCxnSpPr>
+              <p:cNvPr id="89" name="Straight Connector 88">
+                <a:extLst>
+                  <a:ext uri="{FF2B5EF4-FFF2-40B4-BE49-F238E27FC236}">
+                    <a16:creationId xmlns:a16="http://schemas.microsoft.com/office/drawing/2014/main" id="{6CC1264B-29BC-4837-9075-0539521D333E}"/>
+                  </a:ext>
+                </a:extLst>
+              </p:cNvPr>
+              <p:cNvCxnSpPr/>
+              <p:nvPr/>
+            </p:nvCxnSpPr>
+            <p:spPr>
+              <a:xfrm flipV="1">
+                <a:off x="5040000" y="2304000"/>
+                <a:ext cx="0" cy="156845"/>
+              </a:xfrm>
+              <a:prstGeom prst="line">
+                <a:avLst/>
+              </a:prstGeom>
+              <a:grpFill/>
+              <a:ln w="76200" cap="rnd">
+                <a:solidFill>
+                  <a:schemeClr val="tx1">
+                    <a:lumMod val="85000"/>
+                    <a:lumOff val="15000"/>
+                  </a:schemeClr>
+                </a:solidFill>
+              </a:ln>
+            </p:spPr>
+            <p:style>
+              <a:lnRef idx="1">
+                <a:schemeClr val="accent1"/>
+              </a:lnRef>
+              <a:fillRef idx="0">
+                <a:schemeClr val="accent1"/>
+              </a:fillRef>
+              <a:effectRef idx="0">
+                <a:schemeClr val="accent1"/>
+              </a:effectRef>
+              <a:fontRef idx="minor">
+                <a:schemeClr val="tx1"/>
+              </a:fontRef>
+            </p:style>
+          </p:cxnSp>
+          <p:cxnSp>
+            <p:nvCxnSpPr>
+              <p:cNvPr id="90" name="Straight Connector 89">
+                <a:extLst>
+                  <a:ext uri="{FF2B5EF4-FFF2-40B4-BE49-F238E27FC236}">
+                    <a16:creationId xmlns:a16="http://schemas.microsoft.com/office/drawing/2014/main" id="{73A7276D-84A5-4366-B5D4-A26729678E58}"/>
+                  </a:ext>
+                </a:extLst>
+              </p:cNvPr>
+              <p:cNvCxnSpPr/>
+              <p:nvPr/>
+            </p:nvCxnSpPr>
+            <p:spPr>
+              <a:xfrm flipV="1">
+                <a:off x="5220000" y="2304000"/>
+                <a:ext cx="0" cy="156845"/>
+              </a:xfrm>
+              <a:prstGeom prst="line">
+                <a:avLst/>
+              </a:prstGeom>
+              <a:grpFill/>
+              <a:ln w="76200" cap="rnd">
+                <a:solidFill>
+                  <a:schemeClr val="tx1">
+                    <a:lumMod val="85000"/>
+                    <a:lumOff val="15000"/>
+                  </a:schemeClr>
+                </a:solidFill>
+              </a:ln>
+            </p:spPr>
+            <p:style>
+              <a:lnRef idx="1">
+                <a:schemeClr val="accent1"/>
+              </a:lnRef>
+              <a:fillRef idx="0">
+                <a:schemeClr val="accent1"/>
+              </a:fillRef>
+              <a:effectRef idx="0">
+                <a:schemeClr val="accent1"/>
+              </a:effectRef>
+              <a:fontRef idx="minor">
+                <a:schemeClr val="tx1"/>
+              </a:fontRef>
+            </p:style>
+          </p:cxnSp>
+          <p:cxnSp>
+            <p:nvCxnSpPr>
+              <p:cNvPr id="91" name="Straight Connector 90">
+                <a:extLst>
+                  <a:ext uri="{FF2B5EF4-FFF2-40B4-BE49-F238E27FC236}">
+                    <a16:creationId xmlns:a16="http://schemas.microsoft.com/office/drawing/2014/main" id="{68C10289-494C-46AF-8744-D8ADBF6F9287}"/>
+                  </a:ext>
+                </a:extLst>
+              </p:cNvPr>
+              <p:cNvCxnSpPr/>
+              <p:nvPr/>
+            </p:nvCxnSpPr>
+            <p:spPr>
+              <a:xfrm flipV="1">
+                <a:off x="5400000" y="2304000"/>
+                <a:ext cx="0" cy="156845"/>
+              </a:xfrm>
+              <a:prstGeom prst="line">
+                <a:avLst/>
+              </a:prstGeom>
+              <a:grpFill/>
+              <a:ln w="76200" cap="rnd">
+                <a:solidFill>
+                  <a:schemeClr val="tx1">
+                    <a:lumMod val="85000"/>
+                    <a:lumOff val="15000"/>
+                  </a:schemeClr>
+                </a:solidFill>
+              </a:ln>
+            </p:spPr>
+            <p:style>
+              <a:lnRef idx="1">
+                <a:schemeClr val="accent1"/>
+              </a:lnRef>
+              <a:fillRef idx="0">
+                <a:schemeClr val="accent1"/>
+              </a:fillRef>
+              <a:effectRef idx="0">
+                <a:schemeClr val="accent1"/>
+              </a:effectRef>
+              <a:fontRef idx="minor">
+                <a:schemeClr val="tx1"/>
+              </a:fontRef>
+            </p:style>
+          </p:cxnSp>
+          <p:cxnSp>
+            <p:nvCxnSpPr>
+              <p:cNvPr id="92" name="Straight Connector 91">
+                <a:extLst>
+                  <a:ext uri="{FF2B5EF4-FFF2-40B4-BE49-F238E27FC236}">
+                    <a16:creationId xmlns:a16="http://schemas.microsoft.com/office/drawing/2014/main" id="{F0653296-4C01-4D7D-9DB7-B55F7A716B9E}"/>
+                  </a:ext>
+                </a:extLst>
+              </p:cNvPr>
+              <p:cNvCxnSpPr/>
+              <p:nvPr/>
+            </p:nvCxnSpPr>
+            <p:spPr>
+              <a:xfrm flipV="1">
+                <a:off x="5580000" y="2304000"/>
+                <a:ext cx="0" cy="156845"/>
+              </a:xfrm>
+              <a:prstGeom prst="line">
+                <a:avLst/>
+              </a:prstGeom>
+              <a:grpFill/>
+              <a:ln w="76200" cap="rnd">
+                <a:solidFill>
+                  <a:schemeClr val="tx1">
+                    <a:lumMod val="85000"/>
+                    <a:lumOff val="15000"/>
+                  </a:schemeClr>
+                </a:solidFill>
+              </a:ln>
+            </p:spPr>
+            <p:style>
+              <a:lnRef idx="1">
+                <a:schemeClr val="accent1"/>
+              </a:lnRef>
+              <a:fillRef idx="0">
+                <a:schemeClr val="accent1"/>
+              </a:fillRef>
+              <a:effectRef idx="0">
+                <a:schemeClr val="accent1"/>
+              </a:effectRef>
+              <a:fontRef idx="minor">
+                <a:schemeClr val="tx1"/>
+              </a:fontRef>
+            </p:style>
+          </p:cxnSp>
+          <p:cxnSp>
+            <p:nvCxnSpPr>
+              <p:cNvPr id="93" name="Straight Connector 92">
+                <a:extLst>
+                  <a:ext uri="{FF2B5EF4-FFF2-40B4-BE49-F238E27FC236}">
+                    <a16:creationId xmlns:a16="http://schemas.microsoft.com/office/drawing/2014/main" id="{AD478BB0-6A5C-442B-A0CC-D0101675075C}"/>
+                  </a:ext>
+                </a:extLst>
+              </p:cNvPr>
+              <p:cNvCxnSpPr/>
+              <p:nvPr/>
+            </p:nvCxnSpPr>
+            <p:spPr>
+              <a:xfrm flipV="1">
+                <a:off x="5760000" y="2304000"/>
+                <a:ext cx="0" cy="156845"/>
+              </a:xfrm>
+              <a:prstGeom prst="line">
+                <a:avLst/>
+              </a:prstGeom>
+              <a:grpFill/>
+              <a:ln w="76200" cap="rnd">
+                <a:solidFill>
+                  <a:schemeClr val="tx1">
+                    <a:lumMod val="85000"/>
+                    <a:lumOff val="15000"/>
+                  </a:schemeClr>
+                </a:solidFill>
+              </a:ln>
+            </p:spPr>
+            <p:style>
+              <a:lnRef idx="1">
+                <a:schemeClr val="accent1"/>
+              </a:lnRef>
+              <a:fillRef idx="0">
+                <a:schemeClr val="accent1"/>
+              </a:fillRef>
+              <a:effectRef idx="0">
+                <a:schemeClr val="accent1"/>
+              </a:effectRef>
+              <a:fontRef idx="minor">
+                <a:schemeClr val="tx1"/>
+              </a:fontRef>
+            </p:style>
+          </p:cxnSp>
+          <p:cxnSp>
+            <p:nvCxnSpPr>
+              <p:cNvPr id="94" name="Straight Connector 93">
+                <a:extLst>
+                  <a:ext uri="{FF2B5EF4-FFF2-40B4-BE49-F238E27FC236}">
+                    <a16:creationId xmlns:a16="http://schemas.microsoft.com/office/drawing/2014/main" id="{52E781EC-E927-4A7D-B4FA-8A14E0689EE4}"/>
+                  </a:ext>
+                </a:extLst>
+              </p:cNvPr>
+              <p:cNvCxnSpPr/>
+              <p:nvPr/>
+            </p:nvCxnSpPr>
+            <p:spPr>
+              <a:xfrm flipV="1">
+                <a:off x="5940000" y="2304000"/>
+                <a:ext cx="0" cy="156845"/>
+              </a:xfrm>
+              <a:prstGeom prst="line">
+                <a:avLst/>
+              </a:prstGeom>
+              <a:grpFill/>
+              <a:ln w="76200" cap="rnd">
+                <a:solidFill>
+                  <a:schemeClr val="tx1">
+                    <a:lumMod val="85000"/>
+                    <a:lumOff val="15000"/>
+                  </a:schemeClr>
+                </a:solidFill>
+              </a:ln>
+            </p:spPr>
+            <p:style>
+              <a:lnRef idx="1">
+                <a:schemeClr val="accent1"/>
+              </a:lnRef>
+              <a:fillRef idx="0">
+                <a:schemeClr val="accent1"/>
+              </a:fillRef>
+              <a:effectRef idx="0">
+                <a:schemeClr val="accent1"/>
+              </a:effectRef>
+              <a:fontRef idx="minor">
+                <a:schemeClr val="tx1"/>
+              </a:fontRef>
+            </p:style>
+          </p:cxnSp>
+        </p:grpSp>
+        <p:sp>
+          <p:nvSpPr>
+            <p:cNvPr id="87" name="Freeform: Shape 86">
+              <a:extLst>
+                <a:ext uri="{FF2B5EF4-FFF2-40B4-BE49-F238E27FC236}">
+                  <a16:creationId xmlns:a16="http://schemas.microsoft.com/office/drawing/2014/main" id="{77D37547-7481-4CD7-BABC-9D189E56D00C}"/>
+                </a:ext>
+              </a:extLst>
+            </p:cNvPr>
+            <p:cNvSpPr/>
+            <p:nvPr/>
+          </p:nvSpPr>
+          <p:spPr>
+            <a:xfrm>
+              <a:off x="4484370" y="2486025"/>
+              <a:ext cx="1800000" cy="1800000"/>
+            </a:xfrm>
+            <a:custGeom>
+              <a:avLst/>
+              <a:gdLst>
+                <a:gd name="connsiteX0" fmla="*/ 300006 w 1800000"/>
+                <a:gd name="connsiteY0" fmla="*/ 0 h 1800000"/>
+                <a:gd name="connsiteX1" fmla="*/ 1499994 w 1800000"/>
+                <a:gd name="connsiteY1" fmla="*/ 0 h 1800000"/>
+                <a:gd name="connsiteX2" fmla="*/ 1800000 w 1800000"/>
+                <a:gd name="connsiteY2" fmla="*/ 300006 h 1800000"/>
+                <a:gd name="connsiteX3" fmla="*/ 1800000 w 1800000"/>
+                <a:gd name="connsiteY3" fmla="*/ 1499994 h 1800000"/>
+                <a:gd name="connsiteX4" fmla="*/ 1499994 w 1800000"/>
+                <a:gd name="connsiteY4" fmla="*/ 1800000 h 1800000"/>
+                <a:gd name="connsiteX5" fmla="*/ 300006 w 1800000"/>
+                <a:gd name="connsiteY5" fmla="*/ 1800000 h 1800000"/>
+                <a:gd name="connsiteX6" fmla="*/ 0 w 1800000"/>
+                <a:gd name="connsiteY6" fmla="*/ 1499994 h 1800000"/>
+                <a:gd name="connsiteX7" fmla="*/ 0 w 1800000"/>
+                <a:gd name="connsiteY7" fmla="*/ 300006 h 1800000"/>
+                <a:gd name="connsiteX8" fmla="*/ 300006 w 1800000"/>
+                <a:gd name="connsiteY8" fmla="*/ 0 h 1800000"/>
+                <a:gd name="connsiteX9" fmla="*/ 364454 w 1800000"/>
+                <a:gd name="connsiteY9" fmla="*/ 252000 h 1800000"/>
+                <a:gd name="connsiteX10" fmla="*/ 252000 w 1800000"/>
+                <a:gd name="connsiteY10" fmla="*/ 364454 h 1800000"/>
+                <a:gd name="connsiteX11" fmla="*/ 252000 w 1800000"/>
+                <a:gd name="connsiteY11" fmla="*/ 1435546 h 1800000"/>
+                <a:gd name="connsiteX12" fmla="*/ 364454 w 1800000"/>
+                <a:gd name="connsiteY12" fmla="*/ 1548000 h 1800000"/>
+                <a:gd name="connsiteX13" fmla="*/ 1435546 w 1800000"/>
+                <a:gd name="connsiteY13" fmla="*/ 1548000 h 1800000"/>
+                <a:gd name="connsiteX14" fmla="*/ 1548000 w 1800000"/>
+                <a:gd name="connsiteY14" fmla="*/ 1435546 h 1800000"/>
+                <a:gd name="connsiteX15" fmla="*/ 1548000 w 1800000"/>
+                <a:gd name="connsiteY15" fmla="*/ 364454 h 1800000"/>
+                <a:gd name="connsiteX16" fmla="*/ 1435546 w 1800000"/>
+                <a:gd name="connsiteY16" fmla="*/ 252000 h 1800000"/>
+                <a:gd name="connsiteX17" fmla="*/ 364454 w 1800000"/>
+                <a:gd name="connsiteY17" fmla="*/ 252000 h 1800000"/>
+              </a:gdLst>
+              <a:ahLst/>
+              <a:cxnLst>
+                <a:cxn ang="0">
+                  <a:pos x="connsiteX0" y="connsiteY0"/>
+                </a:cxn>
+                <a:cxn ang="0">
+                  <a:pos x="connsiteX1" y="connsiteY1"/>
+                </a:cxn>
+                <a:cxn ang="0">
+                  <a:pos x="connsiteX2" y="connsiteY2"/>
+                </a:cxn>
+                <a:cxn ang="0">
+                  <a:pos x="connsiteX3" y="connsiteY3"/>
+                </a:cxn>
+                <a:cxn ang="0">
+                  <a:pos x="connsiteX4" y="connsiteY4"/>
+                </a:cxn>
+                <a:cxn ang="0">
+                  <a:pos x="connsiteX5" y="connsiteY5"/>
+                </a:cxn>
+                <a:cxn ang="0">
+                  <a:pos x="connsiteX6" y="connsiteY6"/>
+                </a:cxn>
+                <a:cxn ang="0">
+                  <a:pos x="connsiteX7" y="connsiteY7"/>
+                </a:cxn>
+                <a:cxn ang="0">
+                  <a:pos x="connsiteX8" y="connsiteY8"/>
+                </a:cxn>
+                <a:cxn ang="0">
+                  <a:pos x="connsiteX9" y="connsiteY9"/>
+                </a:cxn>
+                <a:cxn ang="0">
+                  <a:pos x="connsiteX10" y="connsiteY10"/>
+                </a:cxn>
+                <a:cxn ang="0">
+                  <a:pos x="connsiteX11" y="connsiteY11"/>
+                </a:cxn>
+                <a:cxn ang="0">
+                  <a:pos x="connsiteX12" y="connsiteY12"/>
+                </a:cxn>
+                <a:cxn ang="0">
+                  <a:pos x="connsiteX13" y="connsiteY13"/>
+                </a:cxn>
+                <a:cxn ang="0">
+                  <a:pos x="connsiteX14" y="connsiteY14"/>
+                </a:cxn>
+                <a:cxn ang="0">
+                  <a:pos x="connsiteX15" y="connsiteY15"/>
+                </a:cxn>
+                <a:cxn ang="0">
+                  <a:pos x="connsiteX16" y="connsiteY16"/>
+                </a:cxn>
+                <a:cxn ang="0">
+                  <a:pos x="connsiteX17" y="connsiteY17"/>
+                </a:cxn>
+              </a:cxnLst>
+              <a:rect l="l" t="t" r="r" b="b"/>
+              <a:pathLst>
+                <a:path w="1800000" h="1800000">
+                  <a:moveTo>
+                    <a:pt x="300006" y="0"/>
+                  </a:moveTo>
+                  <a:lnTo>
+                    <a:pt x="1499994" y="0"/>
+                  </a:lnTo>
+                  <a:cubicBezTo>
+                    <a:pt x="1665683" y="0"/>
+                    <a:pt x="1800000" y="134317"/>
+                    <a:pt x="1800000" y="300006"/>
+                  </a:cubicBezTo>
+                  <a:lnTo>
+                    <a:pt x="1800000" y="1499994"/>
+                  </a:lnTo>
+                  <a:cubicBezTo>
+                    <a:pt x="1800000" y="1665683"/>
+                    <a:pt x="1665683" y="1800000"/>
+                    <a:pt x="1499994" y="1800000"/>
+                  </a:cubicBezTo>
+                  <a:lnTo>
+                    <a:pt x="300006" y="1800000"/>
+                  </a:lnTo>
+                  <a:cubicBezTo>
+                    <a:pt x="134317" y="1800000"/>
+                    <a:pt x="0" y="1665683"/>
+                    <a:pt x="0" y="1499994"/>
+                  </a:cubicBezTo>
+                  <a:lnTo>
+                    <a:pt x="0" y="300006"/>
+                  </a:lnTo>
+                  <a:cubicBezTo>
+                    <a:pt x="0" y="134317"/>
+                    <a:pt x="134317" y="0"/>
+                    <a:pt x="300006" y="0"/>
+                  </a:cubicBezTo>
+                  <a:close/>
+                  <a:moveTo>
+                    <a:pt x="364454" y="252000"/>
+                  </a:moveTo>
+                  <a:cubicBezTo>
+                    <a:pt x="302347" y="252000"/>
+                    <a:pt x="252000" y="302347"/>
+                    <a:pt x="252000" y="364454"/>
+                  </a:cubicBezTo>
+                  <a:lnTo>
+                    <a:pt x="252000" y="1435546"/>
+                  </a:lnTo>
+                  <a:cubicBezTo>
+                    <a:pt x="252000" y="1497653"/>
+                    <a:pt x="302347" y="1548000"/>
+                    <a:pt x="364454" y="1548000"/>
+                  </a:cubicBezTo>
+                  <a:lnTo>
+                    <a:pt x="1435546" y="1548000"/>
+                  </a:lnTo>
+                  <a:cubicBezTo>
+                    <a:pt x="1497653" y="1548000"/>
+                    <a:pt x="1548000" y="1497653"/>
+                    <a:pt x="1548000" y="1435546"/>
+                  </a:cubicBezTo>
+                  <a:lnTo>
+                    <a:pt x="1548000" y="364454"/>
+                  </a:lnTo>
+                  <a:cubicBezTo>
+                    <a:pt x="1548000" y="302347"/>
+                    <a:pt x="1497653" y="252000"/>
+                    <a:pt x="1435546" y="252000"/>
+                  </a:cubicBezTo>
+                  <a:lnTo>
+                    <a:pt x="364454" y="252000"/>
+                  </a:lnTo>
+                  <a:close/>
+                </a:path>
+              </a:pathLst>
+            </a:custGeom>
+            <a:solidFill>
+              <a:srgbClr val="9933FF"/>
+            </a:solidFill>
+            <a:ln w="76200">
+              <a:solidFill>
+                <a:schemeClr val="tx1">
+                  <a:lumMod val="85000"/>
+                  <a:lumOff val="15000"/>
+                </a:schemeClr>
+              </a:solidFill>
+            </a:ln>
+            <a:scene3d>
+              <a:camera prst="orthographicFront"/>
+              <a:lightRig rig="threePt" dir="t"/>
+            </a:scene3d>
+            <a:sp3d extrusionH="44450"/>
+          </p:spPr>
+          <p:style>
+            <a:lnRef idx="2">
+              <a:schemeClr val="accent1">
+                <a:shade val="50000"/>
+              </a:schemeClr>
+            </a:lnRef>
+            <a:fillRef idx="1">
+              <a:schemeClr val="accent1"/>
+            </a:fillRef>
+            <a:effectRef idx="0">
+              <a:schemeClr val="accent1"/>
+            </a:effectRef>
+            <a:fontRef idx="minor">
+              <a:schemeClr val="lt1"/>
+            </a:fontRef>
+          </p:style>
+          <p:txBody>
+            <a:bodyPr wrap="square" rtlCol="0" anchor="ctr">
+              <a:noAutofit/>
+            </a:bodyPr>
+            <a:lstStyle/>
+            <a:p>
+              <a:pPr algn="ctr"/>
+              <a:endParaRPr lang="fr-BE"/>
+            </a:p>
+          </p:txBody>
+        </p:sp>
+      </p:grpSp>
     </p:spTree>
     <p:extLst>
       <p:ext uri="{BB962C8B-B14F-4D97-AF65-F5344CB8AC3E}">
@@ -6299,6 +9010,210 @@
                                         <p:cTn id="20" dur="1600" fill="hold"/>
                                         <p:tgtEl>
                                           <p:spTgt spid="17"/>
+                                        </p:tgtEl>
+                                        <p:attrNameLst>
+                                          <p:attrName>fill.on</p:attrName>
+                                        </p:attrNameLst>
+                                      </p:cBhvr>
+                                      <p:to>
+                                        <p:strVal val="true"/>
+                                      </p:to>
+                                    </p:set>
+                                  </p:childTnLst>
+                                </p:cTn>
+                              </p:par>
+                              <p:par>
+                                <p:cTn id="21" presetID="1" presetClass="emph" presetSubtype="10" repeatCount="indefinite" accel="9000" decel="26000" fill="remove" nodeType="withEffect">
+                                  <p:stCondLst>
+                                    <p:cond delay="0"/>
+                                  </p:stCondLst>
+                                  <p:childTnLst>
+                                    <p:animClr clrSpc="hsl" dir="ccw">
+                                      <p:cBhvr>
+                                        <p:cTn id="22" dur="900" fill="hold"/>
+                                        <p:tgtEl>
+                                          <p:spTgt spid="72"/>
+                                        </p:tgtEl>
+                                        <p:attrNameLst>
+                                          <p:attrName>fillcolor</p:attrName>
+                                        </p:attrNameLst>
+                                      </p:cBhvr>
+                                      <p:to>
+                                        <a:srgbClr val="67D04E"/>
+                                      </p:to>
+                                    </p:animClr>
+                                    <p:set>
+                                      <p:cBhvr>
+                                        <p:cTn id="23" dur="900" fill="hold"/>
+                                        <p:tgtEl>
+                                          <p:spTgt spid="72"/>
+                                        </p:tgtEl>
+                                        <p:attrNameLst>
+                                          <p:attrName>fill.type</p:attrName>
+                                        </p:attrNameLst>
+                                      </p:cBhvr>
+                                      <p:to>
+                                        <p:strVal val="solid"/>
+                                      </p:to>
+                                    </p:set>
+                                    <p:set>
+                                      <p:cBhvr>
+                                        <p:cTn id="24" dur="900" fill="hold"/>
+                                        <p:tgtEl>
+                                          <p:spTgt spid="72"/>
+                                        </p:tgtEl>
+                                        <p:attrNameLst>
+                                          <p:attrName>fill.on</p:attrName>
+                                        </p:attrNameLst>
+                                      </p:cBhvr>
+                                      <p:to>
+                                        <p:strVal val="true"/>
+                                      </p:to>
+                                    </p:set>
+                                  </p:childTnLst>
+                                </p:cTn>
+                              </p:par>
+                              <p:par>
+                                <p:cTn id="25" presetID="1" presetClass="emph" presetSubtype="10" repeatCount="indefinite" accel="9000" decel="26000" fill="remove" nodeType="withEffect">
+                                  <p:stCondLst>
+                                    <p:cond delay="0"/>
+                                  </p:stCondLst>
+                                  <p:childTnLst>
+                                    <p:animClr clrSpc="hsl" dir="ccw">
+                                      <p:cBhvr>
+                                        <p:cTn id="26" dur="2200" fill="hold"/>
+                                        <p:tgtEl>
+                                          <p:spTgt spid="64"/>
+                                        </p:tgtEl>
+                                        <p:attrNameLst>
+                                          <p:attrName>fillcolor</p:attrName>
+                                        </p:attrNameLst>
+                                      </p:cBhvr>
+                                      <p:to>
+                                        <a:srgbClr val="67D04E"/>
+                                      </p:to>
+                                    </p:animClr>
+                                    <p:set>
+                                      <p:cBhvr>
+                                        <p:cTn id="27" dur="2200" fill="hold"/>
+                                        <p:tgtEl>
+                                          <p:spTgt spid="64"/>
+                                        </p:tgtEl>
+                                        <p:attrNameLst>
+                                          <p:attrName>fill.type</p:attrName>
+                                        </p:attrNameLst>
+                                      </p:cBhvr>
+                                      <p:to>
+                                        <p:strVal val="solid"/>
+                                      </p:to>
+                                    </p:set>
+                                    <p:set>
+                                      <p:cBhvr>
+                                        <p:cTn id="28" dur="2200" fill="hold"/>
+                                        <p:tgtEl>
+                                          <p:spTgt spid="64"/>
+                                        </p:tgtEl>
+                                        <p:attrNameLst>
+                                          <p:attrName>fill.on</p:attrName>
+                                        </p:attrNameLst>
+                                      </p:cBhvr>
+                                      <p:to>
+                                        <p:strVal val="true"/>
+                                      </p:to>
+                                    </p:set>
+                                  </p:childTnLst>
+                                </p:cTn>
+                              </p:par>
+                              <p:par>
+                                <p:cTn id="29" presetID="1" presetClass="emph" presetSubtype="10" repeatCount="indefinite" accel="9000" decel="26000" fill="remove" nodeType="withEffect">
+                                  <p:stCondLst>
+                                    <p:cond delay="0"/>
+                                  </p:stCondLst>
+                                  <p:childTnLst>
+                                    <p:animClr clrSpc="hsl" dir="ccw">
+                                      <p:cBhvr>
+                                        <p:cTn id="30" dur="1300" fill="hold"/>
+                                        <p:tgtEl>
+                                          <p:spTgt spid="68"/>
+                                        </p:tgtEl>
+                                        <p:attrNameLst>
+                                          <p:attrName>fillcolor</p:attrName>
+                                        </p:attrNameLst>
+                                      </p:cBhvr>
+                                      <p:to>
+                                        <a:srgbClr val="67D04E"/>
+                                      </p:to>
+                                    </p:animClr>
+                                    <p:set>
+                                      <p:cBhvr>
+                                        <p:cTn id="31" dur="1300" fill="hold"/>
+                                        <p:tgtEl>
+                                          <p:spTgt spid="68"/>
+                                        </p:tgtEl>
+                                        <p:attrNameLst>
+                                          <p:attrName>fill.type</p:attrName>
+                                        </p:attrNameLst>
+                                      </p:cBhvr>
+                                      <p:to>
+                                        <p:strVal val="solid"/>
+                                      </p:to>
+                                    </p:set>
+                                    <p:set>
+                                      <p:cBhvr>
+                                        <p:cTn id="32" dur="1300" fill="hold"/>
+                                        <p:tgtEl>
+                                          <p:spTgt spid="68"/>
+                                        </p:tgtEl>
+                                        <p:attrNameLst>
+                                          <p:attrName>fill.on</p:attrName>
+                                        </p:attrNameLst>
+                                      </p:cBhvr>
+                                      <p:to>
+                                        <p:strVal val="true"/>
+                                      </p:to>
+                                    </p:set>
+                                  </p:childTnLst>
+                                </p:cTn>
+                              </p:par>
+                              <p:par>
+                                <p:cTn id="33" presetID="1" presetClass="emph" presetSubtype="10" repeatCount="indefinite" accel="9000" decel="26000" fill="remove" nodeType="withEffect">
+                                  <p:stCondLst>
+                                    <p:cond delay="0"/>
+                                  </p:stCondLst>
+                                  <p:childTnLst>
+                                    <p:animClr clrSpc="hsl" dir="ccw">
+                                      <p:cBhvr>
+                                        <p:cTn id="34" dur="1600" fill="hold"/>
+                                        <p:tgtEl>
+                                          <p:spTgt spid="73"/>
+                                        </p:tgtEl>
+                                        <p:attrNameLst>
+                                          <p:attrName>fillcolor</p:attrName>
+                                        </p:attrNameLst>
+                                      </p:cBhvr>
+                                      <p:to>
+                                        <a:srgbClr val="67D04E"/>
+                                      </p:to>
+                                    </p:animClr>
+                                    <p:set>
+                                      <p:cBhvr>
+                                        <p:cTn id="35" dur="1600" fill="hold"/>
+                                        <p:tgtEl>
+                                          <p:spTgt spid="73"/>
+                                        </p:tgtEl>
+                                        <p:attrNameLst>
+                                          <p:attrName>fill.type</p:attrName>
+                                        </p:attrNameLst>
+                                      </p:cBhvr>
+                                      <p:to>
+                                        <p:strVal val="solid"/>
+                                      </p:to>
+                                    </p:set>
+                                    <p:set>
+                                      <p:cBhvr>
+                                        <p:cTn id="36" dur="1600" fill="hold"/>
+                                        <p:tgtEl>
+                                          <p:spTgt spid="73"/>
                                         </p:tgtEl>
                                         <p:attrNameLst>
                                           <p:attrName>fill.on</p:attrName>
@@ -45358,6 +48273,872 @@
 </p:sld>
 </file>
 
+<file path=ppt/slides/slide9.xml><?xml version="1.0" encoding="utf-8"?>
+<p:sld xmlns:a="http://schemas.openxmlformats.org/drawingml/2006/main" xmlns:r="http://schemas.openxmlformats.org/officeDocument/2006/relationships" xmlns:p="http://schemas.openxmlformats.org/presentationml/2006/main">
+  <p:cSld>
+    <p:spTree>
+      <p:nvGrpSpPr>
+        <p:cNvPr id="1" name=""/>
+        <p:cNvGrpSpPr/>
+        <p:nvPr/>
+      </p:nvGrpSpPr>
+      <p:grpSpPr>
+        <a:xfrm>
+          <a:off x="0" y="0"/>
+          <a:ext cx="0" cy="0"/>
+          <a:chOff x="0" y="0"/>
+          <a:chExt cx="0" cy="0"/>
+        </a:xfrm>
+      </p:grpSpPr>
+      <p:cxnSp>
+        <p:nvCxnSpPr>
+          <p:cNvPr id="205" name="Straight Connector 204">
+            <a:extLst>
+              <a:ext uri="{FF2B5EF4-FFF2-40B4-BE49-F238E27FC236}">
+                <a16:creationId xmlns:a16="http://schemas.microsoft.com/office/drawing/2014/main" id="{BB86F8D0-E0DD-456B-836E-9F54AEC88B20}"/>
+              </a:ext>
+            </a:extLst>
+          </p:cNvPr>
+          <p:cNvCxnSpPr>
+            <a:cxnSpLocks/>
+          </p:cNvCxnSpPr>
+          <p:nvPr/>
+        </p:nvCxnSpPr>
+        <p:spPr>
+          <a:xfrm flipV="1">
+            <a:off x="8248943" y="5495925"/>
+            <a:ext cx="1224714" cy="333375"/>
+          </a:xfrm>
+          <a:prstGeom prst="line">
+            <a:avLst/>
+          </a:prstGeom>
+          <a:ln w="76200" cap="rnd">
+            <a:solidFill>
+              <a:srgbClr val="FF3737"/>
+            </a:solidFill>
+            <a:round/>
+          </a:ln>
+          <a:scene3d>
+            <a:camera prst="orthographicFront">
+              <a:rot lat="0" lon="21000000" rev="0"/>
+            </a:camera>
+            <a:lightRig rig="threePt" dir="t"/>
+          </a:scene3d>
+        </p:spPr>
+        <p:style>
+          <a:lnRef idx="1">
+            <a:schemeClr val="accent1"/>
+          </a:lnRef>
+          <a:fillRef idx="0">
+            <a:schemeClr val="accent1"/>
+          </a:fillRef>
+          <a:effectRef idx="0">
+            <a:schemeClr val="accent1"/>
+          </a:effectRef>
+          <a:fontRef idx="minor">
+            <a:schemeClr val="tx1"/>
+          </a:fontRef>
+        </p:style>
+      </p:cxnSp>
+      <p:grpSp>
+        <p:nvGrpSpPr>
+          <p:cNvPr id="195" name="Group 194">
+            <a:extLst>
+              <a:ext uri="{FF2B5EF4-FFF2-40B4-BE49-F238E27FC236}">
+                <a16:creationId xmlns:a16="http://schemas.microsoft.com/office/drawing/2014/main" id="{8CADD062-2B57-4EF3-9A28-0523C8886264}"/>
+              </a:ext>
+            </a:extLst>
+          </p:cNvPr>
+          <p:cNvGrpSpPr/>
+          <p:nvPr/>
+        </p:nvGrpSpPr>
+        <p:grpSpPr>
+          <a:xfrm>
+            <a:off x="5962368" y="3753432"/>
+            <a:ext cx="2962713" cy="3707933"/>
+            <a:chOff x="7424257" y="2056701"/>
+            <a:chExt cx="2962713" cy="3707933"/>
+          </a:xfrm>
+          <a:scene3d>
+            <a:camera prst="orthographicFront">
+              <a:rot lat="19254000" lon="16962000" rev="5202000"/>
+            </a:camera>
+            <a:lightRig rig="threePt" dir="t"/>
+          </a:scene3d>
+        </p:grpSpPr>
+        <p:sp>
+          <p:nvSpPr>
+            <p:cNvPr id="196" name="Rectangle: Rounded Corners 195">
+              <a:extLst>
+                <a:ext uri="{FF2B5EF4-FFF2-40B4-BE49-F238E27FC236}">
+                  <a16:creationId xmlns:a16="http://schemas.microsoft.com/office/drawing/2014/main" id="{23094423-B15E-4DFC-8B58-840C5FC66DD5}"/>
+                </a:ext>
+              </a:extLst>
+            </p:cNvPr>
+            <p:cNvSpPr/>
+            <p:nvPr/>
+          </p:nvSpPr>
+          <p:spPr>
+            <a:xfrm>
+              <a:off x="7424257" y="2056701"/>
+              <a:ext cx="192947" cy="3707933"/>
+            </a:xfrm>
+            <a:prstGeom prst="roundRect">
+              <a:avLst>
+                <a:gd name="adj" fmla="val 50000"/>
+              </a:avLst>
+            </a:prstGeom>
+            <a:solidFill>
+              <a:schemeClr val="bg1">
+                <a:lumMod val="85000"/>
+              </a:schemeClr>
+            </a:solidFill>
+            <a:ln w="76200">
+              <a:noFill/>
+            </a:ln>
+            <a:sp3d/>
+          </p:spPr>
+          <p:style>
+            <a:lnRef idx="2">
+              <a:schemeClr val="accent1">
+                <a:shade val="50000"/>
+              </a:schemeClr>
+            </a:lnRef>
+            <a:fillRef idx="1">
+              <a:schemeClr val="accent1"/>
+            </a:fillRef>
+            <a:effectRef idx="0">
+              <a:schemeClr val="accent1"/>
+            </a:effectRef>
+            <a:fontRef idx="minor">
+              <a:schemeClr val="lt1"/>
+            </a:fontRef>
+          </p:style>
+          <p:txBody>
+            <a:bodyPr rtlCol="0" anchor="ctr"/>
+            <a:lstStyle/>
+            <a:p>
+              <a:pPr algn="ctr"/>
+              <a:endParaRPr lang="fr-BE" dirty="0"/>
+            </a:p>
+          </p:txBody>
+        </p:sp>
+        <p:sp>
+          <p:nvSpPr>
+            <p:cNvPr id="197" name="Rectangle: Rounded Corners 196">
+              <a:extLst>
+                <a:ext uri="{FF2B5EF4-FFF2-40B4-BE49-F238E27FC236}">
+                  <a16:creationId xmlns:a16="http://schemas.microsoft.com/office/drawing/2014/main" id="{99337243-BFD1-416C-A207-C5F2880B82F0}"/>
+                </a:ext>
+              </a:extLst>
+            </p:cNvPr>
+            <p:cNvSpPr/>
+            <p:nvPr/>
+          </p:nvSpPr>
+          <p:spPr>
+            <a:xfrm>
+              <a:off x="10194023" y="2056701"/>
+              <a:ext cx="192947" cy="3707933"/>
+            </a:xfrm>
+            <a:prstGeom prst="roundRect">
+              <a:avLst>
+                <a:gd name="adj" fmla="val 50000"/>
+              </a:avLst>
+            </a:prstGeom>
+            <a:solidFill>
+              <a:schemeClr val="bg1">
+                <a:lumMod val="85000"/>
+              </a:schemeClr>
+            </a:solidFill>
+            <a:ln w="76200">
+              <a:noFill/>
+            </a:ln>
+            <a:sp3d/>
+          </p:spPr>
+          <p:style>
+            <a:lnRef idx="2">
+              <a:schemeClr val="accent1">
+                <a:shade val="50000"/>
+              </a:schemeClr>
+            </a:lnRef>
+            <a:fillRef idx="1">
+              <a:schemeClr val="accent1"/>
+            </a:fillRef>
+            <a:effectRef idx="0">
+              <a:schemeClr val="accent1"/>
+            </a:effectRef>
+            <a:fontRef idx="minor">
+              <a:schemeClr val="lt1"/>
+            </a:fontRef>
+          </p:style>
+          <p:txBody>
+            <a:bodyPr rtlCol="0" anchor="ctr"/>
+            <a:lstStyle/>
+            <a:p>
+              <a:pPr algn="ctr"/>
+              <a:endParaRPr lang="fr-BE" dirty="0"/>
+            </a:p>
+          </p:txBody>
+        </p:sp>
+        <p:sp>
+          <p:nvSpPr>
+            <p:cNvPr id="198" name="Flowchart: Stored Data 197">
+              <a:extLst>
+                <a:ext uri="{FF2B5EF4-FFF2-40B4-BE49-F238E27FC236}">
+                  <a16:creationId xmlns:a16="http://schemas.microsoft.com/office/drawing/2014/main" id="{E5844B16-64C7-4A5B-A8EA-D0247E81E401}"/>
+                </a:ext>
+              </a:extLst>
+            </p:cNvPr>
+            <p:cNvSpPr/>
+            <p:nvPr/>
+          </p:nvSpPr>
+          <p:spPr>
+            <a:xfrm rot="16200000">
+              <a:off x="8320836" y="1448847"/>
+              <a:ext cx="1169562" cy="2576819"/>
+            </a:xfrm>
+            <a:prstGeom prst="flowChartOnlineStorage">
+              <a:avLst/>
+            </a:prstGeom>
+            <a:solidFill>
+              <a:schemeClr val="bg1">
+                <a:lumMod val="85000"/>
+              </a:schemeClr>
+            </a:solidFill>
+            <a:ln w="76200">
+              <a:noFill/>
+            </a:ln>
+            <a:sp3d/>
+          </p:spPr>
+          <p:style>
+            <a:lnRef idx="2">
+              <a:schemeClr val="accent1">
+                <a:shade val="50000"/>
+              </a:schemeClr>
+            </a:lnRef>
+            <a:fillRef idx="1">
+              <a:schemeClr val="accent1"/>
+            </a:fillRef>
+            <a:effectRef idx="0">
+              <a:schemeClr val="accent1"/>
+            </a:effectRef>
+            <a:fontRef idx="minor">
+              <a:schemeClr val="lt1"/>
+            </a:fontRef>
+          </p:style>
+          <p:txBody>
+            <a:bodyPr vert="vert" wrap="none" rtlCol="0" anchor="ctr"/>
+            <a:lstStyle/>
+            <a:p>
+              <a:pPr algn="ctr"/>
+              <a:endParaRPr lang="fr-BE" sz="2800" dirty="0"/>
+            </a:p>
+          </p:txBody>
+        </p:sp>
+      </p:grpSp>
+      <p:pic>
+        <p:nvPicPr>
+          <p:cNvPr id="192" name="Picture 191" descr="A picture containing object, clock, train&#10;&#10;Description automatically generated">
+            <a:extLst>
+              <a:ext uri="{FF2B5EF4-FFF2-40B4-BE49-F238E27FC236}">
+                <a16:creationId xmlns:a16="http://schemas.microsoft.com/office/drawing/2014/main" id="{C8E548D0-0177-41D5-8C6A-4C284B08EC97}"/>
+              </a:ext>
+            </a:extLst>
+          </p:cNvPr>
+          <p:cNvPicPr>
+            <a:picLocks noChangeAspect="1"/>
+          </p:cNvPicPr>
+          <p:nvPr/>
+        </p:nvPicPr>
+        <p:blipFill>
+          <a:blip r:embed="rId2">
+            <a:extLst>
+              <a:ext uri="{28A0092B-C50C-407E-A947-70E740481C1C}">
+                <a14:useLocalDpi xmlns:a14="http://schemas.microsoft.com/office/drawing/2010/main" val="0"/>
+              </a:ext>
+            </a:extLst>
+          </a:blip>
+          <a:stretch>
+            <a:fillRect/>
+          </a:stretch>
+        </p:blipFill>
+        <p:spPr>
+          <a:xfrm>
+            <a:off x="7787145" y="4075232"/>
+            <a:ext cx="1587732" cy="1587730"/>
+          </a:xfrm>
+          <a:prstGeom prst="rect">
+            <a:avLst/>
+          </a:prstGeom>
+        </p:spPr>
+      </p:pic>
+      <p:grpSp>
+        <p:nvGrpSpPr>
+          <p:cNvPr id="78" name="Group 77">
+            <a:extLst>
+              <a:ext uri="{FF2B5EF4-FFF2-40B4-BE49-F238E27FC236}">
+                <a16:creationId xmlns:a16="http://schemas.microsoft.com/office/drawing/2014/main" id="{F467CC1D-52B8-494A-9047-C3D40C52A40B}"/>
+              </a:ext>
+            </a:extLst>
+          </p:cNvPr>
+          <p:cNvGrpSpPr/>
+          <p:nvPr/>
+        </p:nvGrpSpPr>
+        <p:grpSpPr>
+          <a:xfrm>
+            <a:off x="7424257" y="2056701"/>
+            <a:ext cx="2962713" cy="3707933"/>
+            <a:chOff x="7424257" y="2056701"/>
+            <a:chExt cx="2962713" cy="3707933"/>
+          </a:xfrm>
+          <a:scene3d>
+            <a:camera prst="orthographicFront">
+              <a:rot lat="900000" lon="18599975" rev="0"/>
+            </a:camera>
+            <a:lightRig rig="threePt" dir="t"/>
+          </a:scene3d>
+        </p:grpSpPr>
+        <p:sp>
+          <p:nvSpPr>
+            <p:cNvPr id="2" name="Rectangle: Rounded Corners 1">
+              <a:extLst>
+                <a:ext uri="{FF2B5EF4-FFF2-40B4-BE49-F238E27FC236}">
+                  <a16:creationId xmlns:a16="http://schemas.microsoft.com/office/drawing/2014/main" id="{8596BD3A-379C-40A6-B491-A05F79B1AF61}"/>
+                </a:ext>
+              </a:extLst>
+            </p:cNvPr>
+            <p:cNvSpPr/>
+            <p:nvPr/>
+          </p:nvSpPr>
+          <p:spPr>
+            <a:xfrm>
+              <a:off x="7424257" y="2056701"/>
+              <a:ext cx="192947" cy="3707933"/>
+            </a:xfrm>
+            <a:prstGeom prst="roundRect">
+              <a:avLst>
+                <a:gd name="adj" fmla="val 50000"/>
+              </a:avLst>
+            </a:prstGeom>
+            <a:solidFill>
+              <a:srgbClr val="996633"/>
+            </a:solidFill>
+            <a:ln w="76200">
+              <a:noFill/>
+            </a:ln>
+            <a:sp3d extrusionH="127000"/>
+          </p:spPr>
+          <p:style>
+            <a:lnRef idx="2">
+              <a:schemeClr val="accent1">
+                <a:shade val="50000"/>
+              </a:schemeClr>
+            </a:lnRef>
+            <a:fillRef idx="1">
+              <a:schemeClr val="accent1"/>
+            </a:fillRef>
+            <a:effectRef idx="0">
+              <a:schemeClr val="accent1"/>
+            </a:effectRef>
+            <a:fontRef idx="minor">
+              <a:schemeClr val="lt1"/>
+            </a:fontRef>
+          </p:style>
+          <p:txBody>
+            <a:bodyPr rtlCol="0" anchor="ctr"/>
+            <a:lstStyle/>
+            <a:p>
+              <a:pPr algn="ctr"/>
+              <a:endParaRPr lang="fr-BE" dirty="0"/>
+            </a:p>
+          </p:txBody>
+        </p:sp>
+        <p:sp>
+          <p:nvSpPr>
+            <p:cNvPr id="3" name="Rectangle: Rounded Corners 2">
+              <a:extLst>
+                <a:ext uri="{FF2B5EF4-FFF2-40B4-BE49-F238E27FC236}">
+                  <a16:creationId xmlns:a16="http://schemas.microsoft.com/office/drawing/2014/main" id="{E24FAFD3-AEB4-4C23-BE6A-E4D985DDAC69}"/>
+                </a:ext>
+              </a:extLst>
+            </p:cNvPr>
+            <p:cNvSpPr/>
+            <p:nvPr/>
+          </p:nvSpPr>
+          <p:spPr>
+            <a:xfrm>
+              <a:off x="10194023" y="2056701"/>
+              <a:ext cx="192947" cy="3707933"/>
+            </a:xfrm>
+            <a:prstGeom prst="roundRect">
+              <a:avLst>
+                <a:gd name="adj" fmla="val 50000"/>
+              </a:avLst>
+            </a:prstGeom>
+            <a:solidFill>
+              <a:srgbClr val="996633"/>
+            </a:solidFill>
+            <a:ln w="76200">
+              <a:noFill/>
+            </a:ln>
+            <a:sp3d extrusionH="127000"/>
+          </p:spPr>
+          <p:style>
+            <a:lnRef idx="2">
+              <a:schemeClr val="accent1">
+                <a:shade val="50000"/>
+              </a:schemeClr>
+            </a:lnRef>
+            <a:fillRef idx="1">
+              <a:schemeClr val="accent1"/>
+            </a:fillRef>
+            <a:effectRef idx="0">
+              <a:schemeClr val="accent1"/>
+            </a:effectRef>
+            <a:fontRef idx="minor">
+              <a:schemeClr val="lt1"/>
+            </a:fontRef>
+          </p:style>
+          <p:txBody>
+            <a:bodyPr rtlCol="0" anchor="ctr"/>
+            <a:lstStyle/>
+            <a:p>
+              <a:pPr algn="ctr"/>
+              <a:endParaRPr lang="fr-BE" dirty="0"/>
+            </a:p>
+          </p:txBody>
+        </p:sp>
+        <p:sp>
+          <p:nvSpPr>
+            <p:cNvPr id="4" name="Flowchart: Stored Data 3">
+              <a:extLst>
+                <a:ext uri="{FF2B5EF4-FFF2-40B4-BE49-F238E27FC236}">
+                  <a16:creationId xmlns:a16="http://schemas.microsoft.com/office/drawing/2014/main" id="{6D8F361A-58CD-452F-B8D2-59A635F7662B}"/>
+                </a:ext>
+              </a:extLst>
+            </p:cNvPr>
+            <p:cNvSpPr/>
+            <p:nvPr/>
+          </p:nvSpPr>
+          <p:spPr>
+            <a:xfrm rot="16200000">
+              <a:off x="8320836" y="1448847"/>
+              <a:ext cx="1169562" cy="2576819"/>
+            </a:xfrm>
+            <a:prstGeom prst="flowChartOnlineStorage">
+              <a:avLst/>
+            </a:prstGeom>
+            <a:solidFill>
+              <a:srgbClr val="FFC000"/>
+            </a:solidFill>
+            <a:ln w="76200">
+              <a:noFill/>
+            </a:ln>
+            <a:sp3d extrusionH="63500"/>
+          </p:spPr>
+          <p:style>
+            <a:lnRef idx="2">
+              <a:schemeClr val="accent1">
+                <a:shade val="50000"/>
+              </a:schemeClr>
+            </a:lnRef>
+            <a:fillRef idx="1">
+              <a:schemeClr val="accent1"/>
+            </a:fillRef>
+            <a:effectRef idx="0">
+              <a:schemeClr val="accent1"/>
+            </a:effectRef>
+            <a:fontRef idx="minor">
+              <a:schemeClr val="lt1"/>
+            </a:fontRef>
+          </p:style>
+          <p:txBody>
+            <a:bodyPr vert="vert" wrap="none" rtlCol="0" anchor="ctr"/>
+            <a:lstStyle/>
+            <a:p>
+              <a:pPr algn="ctr"/>
+              <a:endParaRPr lang="fr-BE" sz="2800" dirty="0"/>
+            </a:p>
+          </p:txBody>
+        </p:sp>
+        <p:sp>
+          <p:nvSpPr>
+            <p:cNvPr id="5" name="TextBox 4">
+              <a:extLst>
+                <a:ext uri="{FF2B5EF4-FFF2-40B4-BE49-F238E27FC236}">
+                  <a16:creationId xmlns:a16="http://schemas.microsoft.com/office/drawing/2014/main" id="{6FD684C3-2422-41A4-8BEB-AE0CC78BC015}"/>
+                </a:ext>
+              </a:extLst>
+            </p:cNvPr>
+            <p:cNvSpPr txBox="1"/>
+            <p:nvPr/>
+          </p:nvSpPr>
+          <p:spPr>
+            <a:xfrm>
+              <a:off x="7667765" y="2314468"/>
+              <a:ext cx="2475697" cy="422788"/>
+            </a:xfrm>
+            <a:prstGeom prst="rect">
+              <a:avLst/>
+            </a:prstGeom>
+            <a:noFill/>
+            <a:sp3d extrusionH="25400"/>
+          </p:spPr>
+          <p:txBody>
+            <a:bodyPr wrap="square" rtlCol="0">
+              <a:prstTxWarp prst="textArchDown">
+                <a:avLst>
+                  <a:gd name="adj" fmla="val 1012121"/>
+                </a:avLst>
+              </a:prstTxWarp>
+              <a:spAutoFit/>
+            </a:bodyPr>
+            <a:lstStyle/>
+            <a:p>
+              <a:pPr algn="ctr"/>
+              <a:r>
+                <a:rPr lang="en-US" sz="3200" dirty="0">
+                  <a:solidFill>
+                    <a:schemeClr val="bg1"/>
+                  </a:solidFill>
+                  <a:latin typeface="Roboto" panose="02000000000000000000" pitchFamily="2" charset="0"/>
+                  <a:ea typeface="Roboto" panose="02000000000000000000" pitchFamily="2" charset="0"/>
+                </a:rPr>
+                <a:t>WAIT FOR LOCK</a:t>
+              </a:r>
+              <a:endParaRPr lang="fr-BE" sz="3200" dirty="0">
+                <a:solidFill>
+                  <a:schemeClr val="bg1"/>
+                </a:solidFill>
+                <a:latin typeface="Roboto" panose="02000000000000000000" pitchFamily="2" charset="0"/>
+                <a:ea typeface="Roboto" panose="02000000000000000000" pitchFamily="2" charset="0"/>
+              </a:endParaRPr>
+            </a:p>
+          </p:txBody>
+        </p:sp>
+        <p:sp>
+          <p:nvSpPr>
+            <p:cNvPr id="12" name="TextBox 11">
+              <a:extLst>
+                <a:ext uri="{FF2B5EF4-FFF2-40B4-BE49-F238E27FC236}">
+                  <a16:creationId xmlns:a16="http://schemas.microsoft.com/office/drawing/2014/main" id="{5DE80379-3682-47E9-AD1A-59D82D24CC14}"/>
+                </a:ext>
+              </a:extLst>
+            </p:cNvPr>
+            <p:cNvSpPr txBox="1"/>
+            <p:nvPr/>
+          </p:nvSpPr>
+          <p:spPr>
+            <a:xfrm>
+              <a:off x="8534605" y="2840439"/>
+              <a:ext cx="746125" cy="307777"/>
+            </a:xfrm>
+            <a:prstGeom prst="rect">
+              <a:avLst/>
+            </a:prstGeom>
+            <a:noFill/>
+            <a:sp3d extrusionH="25400"/>
+          </p:spPr>
+          <p:txBody>
+            <a:bodyPr wrap="square" rtlCol="0">
+              <a:spAutoFit/>
+            </a:bodyPr>
+            <a:lstStyle/>
+            <a:p>
+              <a:pPr algn="ctr"/>
+              <a:r>
+                <a:rPr lang="en-US" sz="1400" dirty="0">
+                  <a:solidFill>
+                    <a:schemeClr val="bg1"/>
+                  </a:solidFill>
+                  <a:latin typeface="Roboto" panose="02000000000000000000" pitchFamily="2" charset="0"/>
+                  <a:ea typeface="Roboto" panose="02000000000000000000" pitchFamily="2" charset="0"/>
+                </a:rPr>
+                <a:t>1.5 m</a:t>
+              </a:r>
+              <a:endParaRPr lang="fr-BE" sz="1400" dirty="0">
+                <a:solidFill>
+                  <a:schemeClr val="bg1"/>
+                </a:solidFill>
+                <a:latin typeface="Roboto" panose="02000000000000000000" pitchFamily="2" charset="0"/>
+                <a:ea typeface="Roboto" panose="02000000000000000000" pitchFamily="2" charset="0"/>
+              </a:endParaRPr>
+            </a:p>
+          </p:txBody>
+        </p:sp>
+        <p:pic>
+          <p:nvPicPr>
+            <p:cNvPr id="72" name="Picture 71" descr="A picture containing object, clock, train&#10;&#10;Description automatically generated">
+              <a:extLst>
+                <a:ext uri="{FF2B5EF4-FFF2-40B4-BE49-F238E27FC236}">
+                  <a16:creationId xmlns:a16="http://schemas.microsoft.com/office/drawing/2014/main" id="{AAA967B7-2EB9-4B54-81B7-E2E5DCE46A30}"/>
+                </a:ext>
+              </a:extLst>
+            </p:cNvPr>
+            <p:cNvPicPr>
+              <a:picLocks noChangeAspect="1"/>
+            </p:cNvPicPr>
+            <p:nvPr/>
+          </p:nvPicPr>
+          <p:blipFill>
+            <a:blip r:embed="rId2">
+              <a:extLst>
+                <a:ext uri="{28A0092B-C50C-407E-A947-70E740481C1C}">
+                  <a14:useLocalDpi xmlns:a14="http://schemas.microsoft.com/office/drawing/2010/main" val="0"/>
+                </a:ext>
+              </a:extLst>
+            </a:blip>
+            <a:stretch>
+              <a:fillRect/>
+            </a:stretch>
+          </p:blipFill>
+          <p:spPr>
+            <a:xfrm rot="20872119">
+              <a:off x="9725038" y="2824033"/>
+              <a:ext cx="338423" cy="338423"/>
+            </a:xfrm>
+            <a:prstGeom prst="rect">
+              <a:avLst/>
+            </a:prstGeom>
+            <a:sp3d extrusionH="25400"/>
+          </p:spPr>
+        </p:pic>
+        <p:pic>
+          <p:nvPicPr>
+            <p:cNvPr id="74" name="Picture 73" descr="A close up of a sign&#10;&#10;Description automatically generated">
+              <a:extLst>
+                <a:ext uri="{FF2B5EF4-FFF2-40B4-BE49-F238E27FC236}">
+                  <a16:creationId xmlns:a16="http://schemas.microsoft.com/office/drawing/2014/main" id="{4A4B1687-2E11-403D-9BE9-945CAD94273B}"/>
+                </a:ext>
+              </a:extLst>
+            </p:cNvPr>
+            <p:cNvPicPr>
+              <a:picLocks noChangeAspect="1"/>
+            </p:cNvPicPr>
+            <p:nvPr/>
+          </p:nvPicPr>
+          <p:blipFill>
+            <a:blip r:embed="rId3">
+              <a:extLst>
+                <a:ext uri="{28A0092B-C50C-407E-A947-70E740481C1C}">
+                  <a14:useLocalDpi xmlns:a14="http://schemas.microsoft.com/office/drawing/2010/main" val="0"/>
+                </a:ext>
+              </a:extLst>
+            </a:blip>
+            <a:stretch>
+              <a:fillRect/>
+            </a:stretch>
+          </p:blipFill>
+          <p:spPr>
+            <a:xfrm rot="715763">
+              <a:off x="7741882" y="2833030"/>
+              <a:ext cx="344305" cy="342434"/>
+            </a:xfrm>
+            <a:prstGeom prst="rect">
+              <a:avLst/>
+            </a:prstGeom>
+            <a:sp3d extrusionH="25400"/>
+          </p:spPr>
+        </p:pic>
+        <p:sp>
+          <p:nvSpPr>
+            <p:cNvPr id="77" name="Freeform: Shape 76">
+              <a:extLst>
+                <a:ext uri="{FF2B5EF4-FFF2-40B4-BE49-F238E27FC236}">
+                  <a16:creationId xmlns:a16="http://schemas.microsoft.com/office/drawing/2014/main" id="{2BE7DCFD-01E8-40EA-8E93-DCB36227A2CB}"/>
+                </a:ext>
+              </a:extLst>
+            </p:cNvPr>
+            <p:cNvSpPr/>
+            <p:nvPr/>
+          </p:nvSpPr>
+          <p:spPr>
+            <a:xfrm>
+              <a:off x="8210862" y="3054350"/>
+              <a:ext cx="1428438" cy="93866"/>
+            </a:xfrm>
+            <a:custGeom>
+              <a:avLst/>
+              <a:gdLst>
+                <a:gd name="connsiteX0" fmla="*/ 0 w 1352550"/>
+                <a:gd name="connsiteY0" fmla="*/ 0 h 72712"/>
+                <a:gd name="connsiteX1" fmla="*/ 1352550 w 1352550"/>
+                <a:gd name="connsiteY1" fmla="*/ 0 h 72712"/>
+                <a:gd name="connsiteX0" fmla="*/ 0 w 1352550"/>
+                <a:gd name="connsiteY0" fmla="*/ 0 h 79028"/>
+                <a:gd name="connsiteX1" fmla="*/ 1352550 w 1352550"/>
+                <a:gd name="connsiteY1" fmla="*/ 0 h 79028"/>
+                <a:gd name="connsiteX0" fmla="*/ 0 w 1352550"/>
+                <a:gd name="connsiteY0" fmla="*/ 0 h 88477"/>
+                <a:gd name="connsiteX1" fmla="*/ 1352550 w 1352550"/>
+                <a:gd name="connsiteY1" fmla="*/ 0 h 88477"/>
+                <a:gd name="connsiteX0" fmla="*/ 0 w 1352550"/>
+                <a:gd name="connsiteY0" fmla="*/ 0 h 83627"/>
+                <a:gd name="connsiteX1" fmla="*/ 1352550 w 1352550"/>
+                <a:gd name="connsiteY1" fmla="*/ 0 h 83627"/>
+                <a:gd name="connsiteX0" fmla="*/ 0 w 1352550"/>
+                <a:gd name="connsiteY0" fmla="*/ 0 h 71382"/>
+                <a:gd name="connsiteX1" fmla="*/ 1352550 w 1352550"/>
+                <a:gd name="connsiteY1" fmla="*/ 0 h 71382"/>
+              </a:gdLst>
+              <a:ahLst/>
+              <a:cxnLst>
+                <a:cxn ang="0">
+                  <a:pos x="connsiteX0" y="connsiteY0"/>
+                </a:cxn>
+                <a:cxn ang="0">
+                  <a:pos x="connsiteX1" y="connsiteY1"/>
+                </a:cxn>
+              </a:cxnLst>
+              <a:rect l="l" t="t" r="r" b="b"/>
+              <a:pathLst>
+                <a:path w="1352550" h="71382">
+                  <a:moveTo>
+                    <a:pt x="0" y="0"/>
+                  </a:moveTo>
+                  <a:cubicBezTo>
+                    <a:pt x="350308" y="77838"/>
+                    <a:pt x="783167" y="111076"/>
+                    <a:pt x="1352550" y="0"/>
+                  </a:cubicBezTo>
+                </a:path>
+              </a:pathLst>
+            </a:custGeom>
+            <a:noFill/>
+            <a:ln w="76200" cap="rnd">
+              <a:solidFill>
+                <a:schemeClr val="bg1"/>
+              </a:solidFill>
+              <a:headEnd type="triangle"/>
+              <a:tailEnd type="triangle"/>
+            </a:ln>
+            <a:sp3d extrusionH="25400"/>
+          </p:spPr>
+          <p:style>
+            <a:lnRef idx="2">
+              <a:schemeClr val="accent1">
+                <a:shade val="50000"/>
+              </a:schemeClr>
+            </a:lnRef>
+            <a:fillRef idx="1">
+              <a:schemeClr val="accent1"/>
+            </a:fillRef>
+            <a:effectRef idx="0">
+              <a:schemeClr val="accent1"/>
+            </a:effectRef>
+            <a:fontRef idx="minor">
+              <a:schemeClr val="lt1"/>
+            </a:fontRef>
+          </p:style>
+          <p:txBody>
+            <a:bodyPr rtlCol="0" anchor="ctr"/>
+            <a:lstStyle/>
+            <a:p>
+              <a:pPr algn="ctr"/>
+              <a:endParaRPr lang="fr-BE"/>
+            </a:p>
+          </p:txBody>
+        </p:sp>
+      </p:grpSp>
+      <p:cxnSp>
+        <p:nvCxnSpPr>
+          <p:cNvPr id="213" name="Straight Connector 212">
+            <a:extLst>
+              <a:ext uri="{FF2B5EF4-FFF2-40B4-BE49-F238E27FC236}">
+                <a16:creationId xmlns:a16="http://schemas.microsoft.com/office/drawing/2014/main" id="{968C53C5-0537-4CF7-8152-04CD7F35D245}"/>
+              </a:ext>
+            </a:extLst>
+          </p:cNvPr>
+          <p:cNvCxnSpPr>
+            <a:cxnSpLocks/>
+          </p:cNvCxnSpPr>
+          <p:nvPr/>
+        </p:nvCxnSpPr>
+        <p:spPr>
+          <a:xfrm flipV="1">
+            <a:off x="5724000" y="5292000"/>
+            <a:ext cx="1259752" cy="329816"/>
+          </a:xfrm>
+          <a:prstGeom prst="line">
+            <a:avLst/>
+          </a:prstGeom>
+          <a:ln w="76200" cap="rnd">
+            <a:solidFill>
+              <a:srgbClr val="FF3737"/>
+            </a:solidFill>
+            <a:round/>
+          </a:ln>
+          <a:scene3d>
+            <a:camera prst="orthographicFront">
+              <a:rot lat="0" lon="21000000" rev="0"/>
+            </a:camera>
+            <a:lightRig rig="threePt" dir="t"/>
+          </a:scene3d>
+        </p:spPr>
+        <p:style>
+          <a:lnRef idx="1">
+            <a:schemeClr val="accent1"/>
+          </a:lnRef>
+          <a:fillRef idx="0">
+            <a:schemeClr val="accent1"/>
+          </a:fillRef>
+          <a:effectRef idx="0">
+            <a:schemeClr val="accent1"/>
+          </a:effectRef>
+          <a:fontRef idx="minor">
+            <a:schemeClr val="tx1"/>
+          </a:fontRef>
+        </p:style>
+      </p:cxnSp>
+      <p:pic>
+        <p:nvPicPr>
+          <p:cNvPr id="194" name="Picture 193" descr="A close up of a sign&#10;&#10;Description automatically generated">
+            <a:extLst>
+              <a:ext uri="{FF2B5EF4-FFF2-40B4-BE49-F238E27FC236}">
+                <a16:creationId xmlns:a16="http://schemas.microsoft.com/office/drawing/2014/main" id="{75EA9F79-AC27-419A-A589-6BAA14D95D67}"/>
+              </a:ext>
+            </a:extLst>
+          </p:cNvPr>
+          <p:cNvPicPr>
+            <a:picLocks noChangeAspect="1"/>
+          </p:cNvPicPr>
+          <p:nvPr/>
+        </p:nvPicPr>
+        <p:blipFill>
+          <a:blip r:embed="rId3">
+            <a:extLst>
+              <a:ext uri="{28A0092B-C50C-407E-A947-70E740481C1C}">
+                <a14:useLocalDpi xmlns:a14="http://schemas.microsoft.com/office/drawing/2010/main" val="0"/>
+              </a:ext>
+            </a:extLst>
+          </a:blip>
+          <a:stretch>
+            <a:fillRect/>
+          </a:stretch>
+        </p:blipFill>
+        <p:spPr>
+          <a:xfrm>
+            <a:off x="5313762" y="4224015"/>
+            <a:ext cx="1297212" cy="1290163"/>
+          </a:xfrm>
+          <a:prstGeom prst="rect">
+            <a:avLst/>
+          </a:prstGeom>
+        </p:spPr>
+      </p:pic>
+    </p:spTree>
+    <p:extLst>
+      <p:ext uri="{BB962C8B-B14F-4D97-AF65-F5344CB8AC3E}">
+        <p14:creationId xmlns:p14="http://schemas.microsoft.com/office/powerpoint/2010/main" val="2441813283"/>
+      </p:ext>
+    </p:extLst>
+  </p:cSld>
+  <p:clrMapOvr>
+    <a:masterClrMapping/>
+  </p:clrMapOvr>
+</p:sld>
+</file>
+
 <file path=ppt/theme/theme1.xml><?xml version="1.0" encoding="utf-8"?>
 <a:theme xmlns:a="http://schemas.openxmlformats.org/drawingml/2006/main" name="Office Theme">
   <a:themeElements>

</xml_diff>